<commit_message>
Add border around the architecture diagram
</commit_message>
<xml_diff>
--- a/assets/xnat-aws-architecture.pptx
+++ b/assets/xnat-aws-architecture.pptx
@@ -2973,10 +2973,10 @@
       </p:grpSpPr>
       <p:grpSp>
         <p:nvGrpSpPr>
-          <p:cNvPr id="12" name="Group 11">
+          <p:cNvPr id="15" name="Group 14">
             <a:extLst>
               <a:ext uri="{FF2B5EF4-FFF2-40B4-BE49-F238E27FC236}">
-                <a16:creationId xmlns:a16="http://schemas.microsoft.com/office/drawing/2014/main" id="{17A757FA-6860-9A0B-A110-9E989041D3DB}"/>
+                <a16:creationId xmlns:a16="http://schemas.microsoft.com/office/drawing/2014/main" id="{D190123E-7720-8C16-0635-897D34BAA413}"/>
               </a:ext>
             </a:extLst>
           </p:cNvPr>
@@ -2985,30 +2985,28 @@
         </p:nvGrpSpPr>
         <p:grpSpPr>
           <a:xfrm>
-            <a:off x="1603200" y="3225706"/>
-            <a:ext cx="8985600" cy="7948800"/>
-            <a:chOff x="1603200" y="3225706"/>
-            <a:chExt cx="8985600" cy="7948800"/>
+            <a:off x="1413164" y="3095398"/>
+            <a:ext cx="9366238" cy="8209912"/>
+            <a:chOff x="1413164" y="3095398"/>
+            <a:chExt cx="9366238" cy="8209912"/>
           </a:xfrm>
         </p:grpSpPr>
         <p:sp>
           <p:nvSpPr>
-            <p:cNvPr id="2" name="Rectangle 1">
+            <p:cNvPr id="14" name="Rectangle 13">
               <a:extLst>
                 <a:ext uri="{FF2B5EF4-FFF2-40B4-BE49-F238E27FC236}">
-                  <a16:creationId xmlns:a16="http://schemas.microsoft.com/office/drawing/2014/main" id="{B92D0945-C30E-EC72-A704-F3A28180C77F}"/>
+                  <a16:creationId xmlns:a16="http://schemas.microsoft.com/office/drawing/2014/main" id="{0762D2DD-B9F9-7AB4-FB76-D71061B78296}"/>
                 </a:ext>
               </a:extLst>
             </p:cNvPr>
-            <p:cNvSpPr>
-              <a:spLocks/>
-            </p:cNvSpPr>
+            <p:cNvSpPr/>
             <p:nvPr/>
           </p:nvSpPr>
           <p:spPr>
             <a:xfrm>
-              <a:off x="1603200" y="3225707"/>
-              <a:ext cx="8985600" cy="7948799"/>
+              <a:off x="1413164" y="3095398"/>
+              <a:ext cx="9366238" cy="8209912"/>
             </a:xfrm>
             <a:prstGeom prst="rect">
               <a:avLst/>
@@ -3016,16 +3014,14 @@
             <a:solidFill>
               <a:schemeClr val="bg1"/>
             </a:solidFill>
-            <a:ln w="15875">
-              <a:solidFill>
-                <a:schemeClr val="tx1"/>
-              </a:solidFill>
+            <a:ln>
+              <a:noFill/>
             </a:ln>
           </p:spPr>
           <p:style>
             <a:lnRef idx="2">
               <a:schemeClr val="accent1">
-                <a:shade val="50000"/>
+                <a:shade val="15000"/>
               </a:schemeClr>
             </a:lnRef>
             <a:fillRef idx="1">
@@ -3039,643 +3035,20 @@
             </a:fontRef>
           </p:style>
           <p:txBody>
-            <a:bodyPr lIns="502920" tIns="91441"/>
+            <a:bodyPr rtlCol="0" anchor="ctr"/>
             <a:lstStyle/>
             <a:p>
-              <a:pPr>
-                <a:defRPr/>
-              </a:pPr>
-              <a:r>
-                <a:rPr lang="en-US" sz="1200" dirty="0">
-                  <a:solidFill>
-                    <a:schemeClr val="tx1"/>
-                  </a:solidFill>
-                  <a:latin typeface="Arial" panose="020B0604020202020204" pitchFamily="34" charset="0"/>
-                  <a:cs typeface="Arial" panose="020B0604020202020204" pitchFamily="34" charset="0"/>
-                </a:rPr>
-                <a:t>AWS Cloud</a:t>
-              </a:r>
+              <a:pPr algn="ctr"/>
+              <a:endParaRPr lang="en-US" dirty="0"/>
             </a:p>
           </p:txBody>
         </p:sp>
-        <p:pic>
-          <p:nvPicPr>
-            <p:cNvPr id="3" name="Graphic 2">
+        <p:grpSp>
+          <p:nvGrpSpPr>
+            <p:cNvPr id="13" name="Group 12">
               <a:extLst>
                 <a:ext uri="{FF2B5EF4-FFF2-40B4-BE49-F238E27FC236}">
-                  <a16:creationId xmlns:a16="http://schemas.microsoft.com/office/drawing/2014/main" id="{AB84112D-60BC-F796-EB16-97D10A4C433B}"/>
-                </a:ext>
-              </a:extLst>
-            </p:cNvPr>
-            <p:cNvPicPr>
-              <a:picLocks noChangeAspect="1"/>
-            </p:cNvPicPr>
-            <p:nvPr/>
-          </p:nvPicPr>
-          <p:blipFill>
-            <a:blip r:embed="rId2">
-              <a:extLst>
-                <a:ext uri="{96DAC541-7B7A-43D3-8B79-37D633B846F1}">
-                  <asvg:svgBlip xmlns:asvg="http://schemas.microsoft.com/office/drawing/2016/SVG/main" r:embed="rId3"/>
-                </a:ext>
-              </a:extLst>
-            </a:blip>
-            <a:srcRect/>
-            <a:stretch/>
-          </p:blipFill>
-          <p:spPr>
-            <a:xfrm>
-              <a:off x="1603201" y="3225706"/>
-              <a:ext cx="381001" cy="381001"/>
-            </a:xfrm>
-            <a:prstGeom prst="rect">
-              <a:avLst/>
-            </a:prstGeom>
-          </p:spPr>
-        </p:pic>
-        <p:sp>
-          <p:nvSpPr>
-            <p:cNvPr id="4" name="Rectangle 3">
-              <a:extLst>
-                <a:ext uri="{FF2B5EF4-FFF2-40B4-BE49-F238E27FC236}">
-                  <a16:creationId xmlns:a16="http://schemas.microsoft.com/office/drawing/2014/main" id="{2789CC2C-CEFC-ED26-6292-C412E4038F8D}"/>
-                </a:ext>
-              </a:extLst>
-            </p:cNvPr>
-            <p:cNvSpPr>
-              <a:spLocks/>
-            </p:cNvSpPr>
-            <p:nvPr/>
-          </p:nvSpPr>
-          <p:spPr>
-            <a:xfrm>
-              <a:off x="1638798" y="4231211"/>
-              <a:ext cx="8917200" cy="6868799"/>
-            </a:xfrm>
-            <a:prstGeom prst="rect">
-              <a:avLst/>
-            </a:prstGeom>
-            <a:noFill/>
-            <a:ln w="15875">
-              <a:solidFill>
-                <a:srgbClr val="8C4FFF"/>
-              </a:solidFill>
-            </a:ln>
-          </p:spPr>
-          <p:style>
-            <a:lnRef idx="2">
-              <a:schemeClr val="accent1">
-                <a:shade val="50000"/>
-              </a:schemeClr>
-            </a:lnRef>
-            <a:fillRef idx="1">
-              <a:schemeClr val="accent1"/>
-            </a:fillRef>
-            <a:effectRef idx="0">
-              <a:schemeClr val="accent1"/>
-            </a:effectRef>
-            <a:fontRef idx="minor">
-              <a:schemeClr val="lt1"/>
-            </a:fontRef>
-          </p:style>
-          <p:txBody>
-            <a:bodyPr lIns="502920" tIns="91441"/>
-            <a:lstStyle/>
-            <a:p>
-              <a:pPr>
-                <a:defRPr/>
-              </a:pPr>
-              <a:r>
-                <a:rPr lang="en-US" sz="1200" dirty="0">
-                  <a:ln w="0"/>
-                  <a:solidFill>
-                    <a:srgbClr val="8C4FFF"/>
-                  </a:solidFill>
-                  <a:latin typeface="Arial" panose="020B0604020202020204" pitchFamily="34" charset="0"/>
-                  <a:cs typeface="Arial" panose="020B0604020202020204" pitchFamily="34" charset="0"/>
-                </a:rPr>
-                <a:t>VPC</a:t>
-              </a:r>
-            </a:p>
-            <a:p>
-              <a:pPr>
-                <a:defRPr/>
-              </a:pPr>
-              <a:r>
-                <a:rPr lang="en-US" sz="1000" dirty="0">
-                  <a:ln w="0"/>
-                  <a:solidFill>
-                    <a:srgbClr val="8C4FFF"/>
-                  </a:solidFill>
-                  <a:latin typeface="Arial" panose="020B0604020202020204" pitchFamily="34" charset="0"/>
-                  <a:cs typeface="Arial" panose="020B0604020202020204" pitchFamily="34" charset="0"/>
-                </a:rPr>
-                <a:t>192.168.0.0/16</a:t>
-              </a:r>
-            </a:p>
-          </p:txBody>
-        </p:sp>
-        <p:pic>
-          <p:nvPicPr>
-            <p:cNvPr id="5" name="Graphic 4">
-              <a:extLst>
-                <a:ext uri="{FF2B5EF4-FFF2-40B4-BE49-F238E27FC236}">
-                  <a16:creationId xmlns:a16="http://schemas.microsoft.com/office/drawing/2014/main" id="{1FA23E9C-56E0-EDEF-3BA5-69F970A74660}"/>
-                </a:ext>
-              </a:extLst>
-            </p:cNvPr>
-            <p:cNvPicPr>
-              <a:picLocks noChangeAspect="1"/>
-            </p:cNvPicPr>
-            <p:nvPr/>
-          </p:nvPicPr>
-          <p:blipFill>
-            <a:blip r:embed="rId4">
-              <a:extLst>
-                <a:ext uri="{96DAC541-7B7A-43D3-8B79-37D633B846F1}">
-                  <asvg:svgBlip xmlns:asvg="http://schemas.microsoft.com/office/drawing/2016/SVG/main" r:embed="rId5"/>
-                </a:ext>
-              </a:extLst>
-            </a:blip>
-            <a:srcRect/>
-            <a:stretch/>
-          </p:blipFill>
-          <p:spPr>
-            <a:xfrm>
-              <a:off x="1638798" y="4226447"/>
-              <a:ext cx="381001" cy="381001"/>
-            </a:xfrm>
-            <a:prstGeom prst="rect">
-              <a:avLst/>
-            </a:prstGeom>
-          </p:spPr>
-        </p:pic>
-        <p:sp>
-          <p:nvSpPr>
-            <p:cNvPr id="6" name="Rectangle 5">
-              <a:extLst>
-                <a:ext uri="{FF2B5EF4-FFF2-40B4-BE49-F238E27FC236}">
-                  <a16:creationId xmlns:a16="http://schemas.microsoft.com/office/drawing/2014/main" id="{8E5E65F0-3034-EBFC-AE51-6177A83926E6}"/>
-                </a:ext>
-              </a:extLst>
-            </p:cNvPr>
-            <p:cNvSpPr/>
-            <p:nvPr/>
-          </p:nvSpPr>
-          <p:spPr>
-            <a:xfrm>
-              <a:off x="2055398" y="3728805"/>
-              <a:ext cx="8046000" cy="5907215"/>
-            </a:xfrm>
-            <a:prstGeom prst="rect">
-              <a:avLst/>
-            </a:prstGeom>
-            <a:noFill/>
-            <a:ln w="12700">
-              <a:solidFill>
-                <a:srgbClr val="107FBE"/>
-              </a:solidFill>
-              <a:prstDash val="dash"/>
-            </a:ln>
-          </p:spPr>
-          <p:style>
-            <a:lnRef idx="2">
-              <a:schemeClr val="accent1">
-                <a:shade val="50000"/>
-              </a:schemeClr>
-            </a:lnRef>
-            <a:fillRef idx="1">
-              <a:schemeClr val="accent1"/>
-            </a:fillRef>
-            <a:effectRef idx="0">
-              <a:schemeClr val="accent1"/>
-            </a:effectRef>
-            <a:fontRef idx="minor">
-              <a:schemeClr val="lt1"/>
-            </a:fontRef>
-          </p:style>
-          <p:txBody>
-            <a:bodyPr tIns="91441"/>
-            <a:lstStyle/>
-            <a:p>
-              <a:pPr>
-                <a:defRPr/>
-              </a:pPr>
-              <a:endParaRPr lang="en-US" sz="1200" dirty="0">
-                <a:solidFill>
-                  <a:schemeClr val="accent3"/>
-                </a:solidFill>
-              </a:endParaRPr>
-            </a:p>
-          </p:txBody>
-        </p:sp>
-        <p:sp>
-          <p:nvSpPr>
-            <p:cNvPr id="7" name="Rectangle 37">
-              <a:extLst>
-                <a:ext uri="{FF2B5EF4-FFF2-40B4-BE49-F238E27FC236}">
-                  <a16:creationId xmlns:a16="http://schemas.microsoft.com/office/drawing/2014/main" id="{44B260CA-12E5-6473-99CE-031C87B2AA1D}"/>
-                </a:ext>
-              </a:extLst>
-            </p:cNvPr>
-            <p:cNvSpPr>
-              <a:spLocks noChangeArrowheads="1"/>
-            </p:cNvSpPr>
-            <p:nvPr/>
-          </p:nvSpPr>
-          <p:spPr bwMode="auto">
-            <a:xfrm>
-              <a:off x="5438737" y="3731563"/>
-              <a:ext cx="1279966" cy="430887"/>
-            </a:xfrm>
-            <a:prstGeom prst="rect">
-              <a:avLst/>
-            </a:prstGeom>
-            <a:noFill/>
-            <a:ln w="9525">
-              <a:noFill/>
-              <a:miter lim="800000"/>
-              <a:headEnd/>
-              <a:tailEnd/>
-            </a:ln>
-            <a:extLst>
-              <a:ext uri="{909E8E84-426E-40DD-AFC4-6F175D3DCCD1}">
-                <a14:hiddenFill xmlns:a14="http://schemas.microsoft.com/office/drawing/2010/main">
-                  <a:solidFill>
-                    <a:srgbClr val="FFFFFF"/>
-                  </a:solidFill>
-                </a14:hiddenFill>
-              </a:ext>
-            </a:extLst>
-          </p:spPr>
-          <p:txBody>
-            <a:bodyPr wrap="none">
-              <a:spAutoFit/>
-            </a:bodyPr>
-            <a:lstStyle>
-              <a:lvl1pPr>
-                <a:defRPr>
-                  <a:solidFill>
-                    <a:schemeClr val="tx1"/>
-                  </a:solidFill>
-                  <a:latin typeface="Calibri" panose="020F0502020204030204" pitchFamily="34" charset="0"/>
-                </a:defRPr>
-              </a:lvl1pPr>
-              <a:lvl2pPr marL="742950" indent="-285750">
-                <a:defRPr>
-                  <a:solidFill>
-                    <a:schemeClr val="tx1"/>
-                  </a:solidFill>
-                  <a:latin typeface="Calibri" panose="020F0502020204030204" pitchFamily="34" charset="0"/>
-                </a:defRPr>
-              </a:lvl2pPr>
-              <a:lvl3pPr marL="1143000" indent="-228600">
-                <a:defRPr>
-                  <a:solidFill>
-                    <a:schemeClr val="tx1"/>
-                  </a:solidFill>
-                  <a:latin typeface="Calibri" panose="020F0502020204030204" pitchFamily="34" charset="0"/>
-                </a:defRPr>
-              </a:lvl3pPr>
-              <a:lvl4pPr marL="1600200" indent="-228600">
-                <a:defRPr>
-                  <a:solidFill>
-                    <a:schemeClr val="tx1"/>
-                  </a:solidFill>
-                  <a:latin typeface="Calibri" panose="020F0502020204030204" pitchFamily="34" charset="0"/>
-                </a:defRPr>
-              </a:lvl4pPr>
-              <a:lvl5pPr marL="2057400" indent="-228600">
-                <a:defRPr>
-                  <a:solidFill>
-                    <a:schemeClr val="tx1"/>
-                  </a:solidFill>
-                  <a:latin typeface="Calibri" panose="020F0502020204030204" pitchFamily="34" charset="0"/>
-                </a:defRPr>
-              </a:lvl5pPr>
-              <a:lvl6pPr marL="2514600" indent="-228600" eaLnBrk="0" fontAlgn="base" hangingPunct="0">
-                <a:spcBef>
-                  <a:spcPct val="0"/>
-                </a:spcBef>
-                <a:spcAft>
-                  <a:spcPct val="0"/>
-                </a:spcAft>
-                <a:defRPr>
-                  <a:solidFill>
-                    <a:schemeClr val="tx1"/>
-                  </a:solidFill>
-                  <a:latin typeface="Calibri" panose="020F0502020204030204" pitchFamily="34" charset="0"/>
-                </a:defRPr>
-              </a:lvl6pPr>
-              <a:lvl7pPr marL="2971800" indent="-228600" eaLnBrk="0" fontAlgn="base" hangingPunct="0">
-                <a:spcBef>
-                  <a:spcPct val="0"/>
-                </a:spcBef>
-                <a:spcAft>
-                  <a:spcPct val="0"/>
-                </a:spcAft>
-                <a:defRPr>
-                  <a:solidFill>
-                    <a:schemeClr val="tx1"/>
-                  </a:solidFill>
-                  <a:latin typeface="Calibri" panose="020F0502020204030204" pitchFamily="34" charset="0"/>
-                </a:defRPr>
-              </a:lvl7pPr>
-              <a:lvl8pPr marL="3429000" indent="-228600" eaLnBrk="0" fontAlgn="base" hangingPunct="0">
-                <a:spcBef>
-                  <a:spcPct val="0"/>
-                </a:spcBef>
-                <a:spcAft>
-                  <a:spcPct val="0"/>
-                </a:spcAft>
-                <a:defRPr>
-                  <a:solidFill>
-                    <a:schemeClr val="tx1"/>
-                  </a:solidFill>
-                  <a:latin typeface="Calibri" panose="020F0502020204030204" pitchFamily="34" charset="0"/>
-                </a:defRPr>
-              </a:lvl8pPr>
-              <a:lvl9pPr marL="3886200" indent="-228600" eaLnBrk="0" fontAlgn="base" hangingPunct="0">
-                <a:spcBef>
-                  <a:spcPct val="0"/>
-                </a:spcBef>
-                <a:spcAft>
-                  <a:spcPct val="0"/>
-                </a:spcAft>
-                <a:defRPr>
-                  <a:solidFill>
-                    <a:schemeClr val="tx1"/>
-                  </a:solidFill>
-                  <a:latin typeface="Calibri" panose="020F0502020204030204" pitchFamily="34" charset="0"/>
-                </a:defRPr>
-              </a:lvl9pPr>
-            </a:lstStyle>
-            <a:p>
-              <a:pPr algn="ctr" eaLnBrk="1" hangingPunct="1"/>
-              <a:r>
-                <a:rPr lang="en-US" altLang="en-US" sz="1200" dirty="0">
-                  <a:solidFill>
-                    <a:srgbClr val="0C7FBE"/>
-                  </a:solidFill>
-                  <a:latin typeface="Arial" panose="020B0604020202020204" pitchFamily="34" charset="0"/>
-                  <a:cs typeface="Arial" panose="020B0604020202020204" pitchFamily="34" charset="0"/>
-                </a:rPr>
-                <a:t>Availability zone</a:t>
-              </a:r>
-            </a:p>
-            <a:p>
-              <a:pPr algn="ctr" eaLnBrk="1" hangingPunct="1"/>
-              <a:r>
-                <a:rPr lang="en-US" altLang="en-US" sz="1000" dirty="0">
-                  <a:solidFill>
-                    <a:srgbClr val="0C7FBE"/>
-                  </a:solidFill>
-                  <a:latin typeface="Arial" panose="020B0604020202020204" pitchFamily="34" charset="0"/>
-                  <a:cs typeface="Arial" panose="020B0604020202020204" pitchFamily="34" charset="0"/>
-                </a:rPr>
-                <a:t>eu-west-2a</a:t>
-              </a:r>
-            </a:p>
-          </p:txBody>
-        </p:sp>
-        <p:sp>
-          <p:nvSpPr>
-            <p:cNvPr id="8" name="Rectangle 7">
-              <a:extLst>
-                <a:ext uri="{FF2B5EF4-FFF2-40B4-BE49-F238E27FC236}">
-                  <a16:creationId xmlns:a16="http://schemas.microsoft.com/office/drawing/2014/main" id="{DB765333-26F3-03F9-44B3-AEBC5003C6AE}"/>
-                </a:ext>
-              </a:extLst>
-            </p:cNvPr>
-            <p:cNvSpPr/>
-            <p:nvPr/>
-          </p:nvSpPr>
-          <p:spPr>
-            <a:xfrm>
-              <a:off x="2158690" y="4763463"/>
-              <a:ext cx="5176800" cy="4775224"/>
-            </a:xfrm>
-            <a:prstGeom prst="rect">
-              <a:avLst/>
-            </a:prstGeom>
-            <a:solidFill>
-              <a:srgbClr val="7AA115">
-                <a:alpha val="10000"/>
-              </a:srgbClr>
-            </a:solidFill>
-            <a:ln w="15875" cmpd="sng">
-              <a:noFill/>
-              <a:prstDash val="dash"/>
-            </a:ln>
-          </p:spPr>
-          <p:style>
-            <a:lnRef idx="2">
-              <a:schemeClr val="accent1">
-                <a:shade val="50000"/>
-              </a:schemeClr>
-            </a:lnRef>
-            <a:fillRef idx="1">
-              <a:schemeClr val="accent1"/>
-            </a:fillRef>
-            <a:effectRef idx="0">
-              <a:schemeClr val="accent1"/>
-            </a:effectRef>
-            <a:fontRef idx="minor">
-              <a:schemeClr val="lt1"/>
-            </a:fontRef>
-          </p:style>
-          <p:txBody>
-            <a:bodyPr lIns="502920" tIns="91441" bIns="45720"/>
-            <a:lstStyle/>
-            <a:p>
-              <a:pPr>
-                <a:defRPr/>
-              </a:pPr>
-              <a:r>
-                <a:rPr lang="en-US" sz="1200" dirty="0">
-                  <a:solidFill>
-                    <a:srgbClr val="7AA115"/>
-                  </a:solidFill>
-                  <a:latin typeface="Arial" panose="020B0604020202020204" pitchFamily="34" charset="0"/>
-                  <a:cs typeface="Arial" panose="020B0604020202020204" pitchFamily="34" charset="0"/>
-                </a:rPr>
-                <a:t>Public subnet</a:t>
-              </a:r>
-            </a:p>
-            <a:p>
-              <a:pPr>
-                <a:defRPr/>
-              </a:pPr>
-              <a:r>
-                <a:rPr lang="en-US" sz="1000" dirty="0">
-                  <a:solidFill>
-                    <a:srgbClr val="7AA115"/>
-                  </a:solidFill>
-                  <a:latin typeface="Arial" panose="020B0604020202020204" pitchFamily="34" charset="0"/>
-                  <a:cs typeface="Arial" panose="020B0604020202020204" pitchFamily="34" charset="0"/>
-                </a:rPr>
-                <a:t>192.168.56.0/24</a:t>
-              </a:r>
-            </a:p>
-          </p:txBody>
-        </p:sp>
-        <p:pic>
-          <p:nvPicPr>
-            <p:cNvPr id="9" name="Graphic 8">
-              <a:extLst>
-                <a:ext uri="{FF2B5EF4-FFF2-40B4-BE49-F238E27FC236}">
-                  <a16:creationId xmlns:a16="http://schemas.microsoft.com/office/drawing/2014/main" id="{7BC93939-202D-4F80-7A18-5DA7574C40E8}"/>
-                </a:ext>
-              </a:extLst>
-            </p:cNvPr>
-            <p:cNvPicPr>
-              <a:picLocks noChangeAspect="1"/>
-            </p:cNvPicPr>
-            <p:nvPr/>
-          </p:nvPicPr>
-          <p:blipFill>
-            <a:blip r:embed="rId6">
-              <a:extLst>
-                <a:ext uri="{96DAC541-7B7A-43D3-8B79-37D633B846F1}">
-                  <asvg:svgBlip xmlns:asvg="http://schemas.microsoft.com/office/drawing/2016/SVG/main" r:embed="rId7"/>
-                </a:ext>
-              </a:extLst>
-            </a:blip>
-            <a:srcRect/>
-            <a:stretch/>
-          </p:blipFill>
-          <p:spPr>
-            <a:xfrm>
-              <a:off x="2158690" y="4762828"/>
-              <a:ext cx="381001" cy="381001"/>
-            </a:xfrm>
-            <a:prstGeom prst="rect">
-              <a:avLst/>
-            </a:prstGeom>
-          </p:spPr>
-        </p:pic>
-        <p:sp>
-          <p:nvSpPr>
-            <p:cNvPr id="10" name="Rectangle 9">
-              <a:extLst>
-                <a:ext uri="{FF2B5EF4-FFF2-40B4-BE49-F238E27FC236}">
-                  <a16:creationId xmlns:a16="http://schemas.microsoft.com/office/drawing/2014/main" id="{8DA3D30F-B010-396A-E831-25711E9A1938}"/>
-                </a:ext>
-              </a:extLst>
-            </p:cNvPr>
-            <p:cNvSpPr/>
-            <p:nvPr/>
-          </p:nvSpPr>
-          <p:spPr>
-            <a:xfrm>
-              <a:off x="7407937" y="4762828"/>
-              <a:ext cx="2588400" cy="4773600"/>
-            </a:xfrm>
-            <a:prstGeom prst="rect">
-              <a:avLst/>
-            </a:prstGeom>
-            <a:solidFill>
-              <a:srgbClr val="7AA115">
-                <a:alpha val="10000"/>
-              </a:srgbClr>
-            </a:solidFill>
-            <a:ln w="15875" cmpd="sng">
-              <a:noFill/>
-              <a:prstDash val="dash"/>
-            </a:ln>
-          </p:spPr>
-          <p:style>
-            <a:lnRef idx="2">
-              <a:schemeClr val="accent1">
-                <a:shade val="50000"/>
-              </a:schemeClr>
-            </a:lnRef>
-            <a:fillRef idx="1">
-              <a:schemeClr val="accent1"/>
-            </a:fillRef>
-            <a:effectRef idx="0">
-              <a:schemeClr val="accent1"/>
-            </a:effectRef>
-            <a:fontRef idx="minor">
-              <a:schemeClr val="lt1"/>
-            </a:fontRef>
-          </p:style>
-          <p:txBody>
-            <a:bodyPr lIns="502920" tIns="91441" bIns="45720"/>
-            <a:lstStyle/>
-            <a:p>
-              <a:pPr>
-                <a:defRPr/>
-              </a:pPr>
-              <a:r>
-                <a:rPr lang="en-US" sz="1200" dirty="0">
-                  <a:solidFill>
-                    <a:srgbClr val="7AA115"/>
-                  </a:solidFill>
-                  <a:latin typeface="Arial" panose="020B0604020202020204" pitchFamily="34" charset="0"/>
-                  <a:cs typeface="Arial" panose="020B0604020202020204" pitchFamily="34" charset="0"/>
-                </a:rPr>
-                <a:t>Database subnet</a:t>
-              </a:r>
-            </a:p>
-            <a:p>
-              <a:pPr>
-                <a:defRPr/>
-              </a:pPr>
-              <a:r>
-                <a:rPr lang="en-US" sz="1000" dirty="0">
-                  <a:solidFill>
-                    <a:srgbClr val="7AA115"/>
-                  </a:solidFill>
-                  <a:latin typeface="Arial" panose="020B0604020202020204" pitchFamily="34" charset="0"/>
-                  <a:cs typeface="Arial" panose="020B0604020202020204" pitchFamily="34" charset="0"/>
-                </a:rPr>
-                <a:t>192.168.110.0/24</a:t>
-              </a:r>
-            </a:p>
-          </p:txBody>
-        </p:sp>
-        <p:pic>
-          <p:nvPicPr>
-            <p:cNvPr id="11" name="Graphic 10">
-              <a:extLst>
-                <a:ext uri="{FF2B5EF4-FFF2-40B4-BE49-F238E27FC236}">
-                  <a16:creationId xmlns:a16="http://schemas.microsoft.com/office/drawing/2014/main" id="{4267027E-E74A-C744-6128-FC0AD7484E3F}"/>
-                </a:ext>
-              </a:extLst>
-            </p:cNvPr>
-            <p:cNvPicPr>
-              <a:picLocks noChangeAspect="1"/>
-            </p:cNvPicPr>
-            <p:nvPr/>
-          </p:nvPicPr>
-          <p:blipFill>
-            <a:blip r:embed="rId6">
-              <a:extLst>
-                <a:ext uri="{96DAC541-7B7A-43D3-8B79-37D633B846F1}">
-                  <asvg:svgBlip xmlns:asvg="http://schemas.microsoft.com/office/drawing/2016/SVG/main" r:embed="rId7"/>
-                </a:ext>
-              </a:extLst>
-            </a:blip>
-            <a:srcRect/>
-            <a:stretch/>
-          </p:blipFill>
-          <p:spPr>
-            <a:xfrm>
-              <a:off x="7407937" y="4762191"/>
-              <a:ext cx="381001" cy="381001"/>
-            </a:xfrm>
-            <a:prstGeom prst="rect">
-              <a:avLst/>
-            </a:prstGeom>
-          </p:spPr>
-        </p:pic>
-        <p:grpSp>
-          <p:nvGrpSpPr>
-            <p:cNvPr id="33" name="Group 32">
-              <a:extLst>
-                <a:ext uri="{FF2B5EF4-FFF2-40B4-BE49-F238E27FC236}">
-                  <a16:creationId xmlns:a16="http://schemas.microsoft.com/office/drawing/2014/main" id="{30C4C4A0-7CC1-F09E-9FEA-C6CA2FB3A694}"/>
+                  <a16:creationId xmlns:a16="http://schemas.microsoft.com/office/drawing/2014/main" id="{ED99C13C-49A2-FC94-ED75-35B99C0C63B3}"/>
                 </a:ext>
               </a:extLst>
             </p:cNvPr>
@@ -3684,18 +3057,1573 @@
           </p:nvGrpSpPr>
           <p:grpSpPr>
             <a:xfrm>
-              <a:off x="3598487" y="9959512"/>
-              <a:ext cx="2292350" cy="1040586"/>
-              <a:chOff x="3143388" y="8674133"/>
-              <a:chExt cx="2292350" cy="1040586"/>
+              <a:off x="1603200" y="3225706"/>
+              <a:ext cx="8985600" cy="7948800"/>
+              <a:chOff x="1603200" y="3225706"/>
+              <a:chExt cx="8985600" cy="7948800"/>
             </a:xfrm>
           </p:grpSpPr>
+          <p:sp>
+            <p:nvSpPr>
+              <p:cNvPr id="2" name="Rectangle 1">
+                <a:extLst>
+                  <a:ext uri="{FF2B5EF4-FFF2-40B4-BE49-F238E27FC236}">
+                    <a16:creationId xmlns:a16="http://schemas.microsoft.com/office/drawing/2014/main" id="{B92D0945-C30E-EC72-A704-F3A28180C77F}"/>
+                  </a:ext>
+                </a:extLst>
+              </p:cNvPr>
+              <p:cNvSpPr>
+                <a:spLocks/>
+              </p:cNvSpPr>
+              <p:nvPr/>
+            </p:nvSpPr>
+            <p:spPr>
+              <a:xfrm>
+                <a:off x="1603200" y="3225707"/>
+                <a:ext cx="8985600" cy="7948799"/>
+              </a:xfrm>
+              <a:prstGeom prst="rect">
+                <a:avLst/>
+              </a:prstGeom>
+              <a:solidFill>
+                <a:schemeClr val="bg1"/>
+              </a:solidFill>
+              <a:ln w="15875">
+                <a:solidFill>
+                  <a:schemeClr val="tx1"/>
+                </a:solidFill>
+              </a:ln>
+            </p:spPr>
+            <p:style>
+              <a:lnRef idx="2">
+                <a:schemeClr val="accent1">
+                  <a:shade val="50000"/>
+                </a:schemeClr>
+              </a:lnRef>
+              <a:fillRef idx="1">
+                <a:schemeClr val="accent1"/>
+              </a:fillRef>
+              <a:effectRef idx="0">
+                <a:schemeClr val="accent1"/>
+              </a:effectRef>
+              <a:fontRef idx="minor">
+                <a:schemeClr val="lt1"/>
+              </a:fontRef>
+            </p:style>
+            <p:txBody>
+              <a:bodyPr lIns="502920" tIns="91441"/>
+              <a:lstStyle/>
+              <a:p>
+                <a:pPr>
+                  <a:defRPr/>
+                </a:pPr>
+                <a:r>
+                  <a:rPr lang="en-US" sz="1200" dirty="0">
+                    <a:solidFill>
+                      <a:schemeClr val="tx1"/>
+                    </a:solidFill>
+                    <a:latin typeface="Arial" panose="020B0604020202020204" pitchFamily="34" charset="0"/>
+                    <a:cs typeface="Arial" panose="020B0604020202020204" pitchFamily="34" charset="0"/>
+                  </a:rPr>
+                  <a:t>AWS Cloud</a:t>
+                </a:r>
+              </a:p>
+            </p:txBody>
+          </p:sp>
           <p:pic>
             <p:nvPicPr>
-              <p:cNvPr id="16" name="Graphic 19">
+              <p:cNvPr id="3" name="Graphic 2">
                 <a:extLst>
                   <a:ext uri="{FF2B5EF4-FFF2-40B4-BE49-F238E27FC236}">
-                    <a16:creationId xmlns:a16="http://schemas.microsoft.com/office/drawing/2014/main" id="{5A86BFB6-2961-C67F-E359-E72C4776B0F1}"/>
+                    <a16:creationId xmlns:a16="http://schemas.microsoft.com/office/drawing/2014/main" id="{AB84112D-60BC-F796-EB16-97D10A4C433B}"/>
+                  </a:ext>
+                </a:extLst>
+              </p:cNvPr>
+              <p:cNvPicPr>
+                <a:picLocks noChangeAspect="1"/>
+              </p:cNvPicPr>
+              <p:nvPr/>
+            </p:nvPicPr>
+            <p:blipFill>
+              <a:blip r:embed="rId2">
+                <a:extLst>
+                  <a:ext uri="{96DAC541-7B7A-43D3-8B79-37D633B846F1}">
+                    <asvg:svgBlip xmlns:asvg="http://schemas.microsoft.com/office/drawing/2016/SVG/main" r:embed="rId3"/>
+                  </a:ext>
+                </a:extLst>
+              </a:blip>
+              <a:srcRect/>
+              <a:stretch/>
+            </p:blipFill>
+            <p:spPr>
+              <a:xfrm>
+                <a:off x="1603201" y="3225706"/>
+                <a:ext cx="381001" cy="381001"/>
+              </a:xfrm>
+              <a:prstGeom prst="rect">
+                <a:avLst/>
+              </a:prstGeom>
+            </p:spPr>
+          </p:pic>
+          <p:sp>
+            <p:nvSpPr>
+              <p:cNvPr id="4" name="Rectangle 3">
+                <a:extLst>
+                  <a:ext uri="{FF2B5EF4-FFF2-40B4-BE49-F238E27FC236}">
+                    <a16:creationId xmlns:a16="http://schemas.microsoft.com/office/drawing/2014/main" id="{2789CC2C-CEFC-ED26-6292-C412E4038F8D}"/>
+                  </a:ext>
+                </a:extLst>
+              </p:cNvPr>
+              <p:cNvSpPr>
+                <a:spLocks/>
+              </p:cNvSpPr>
+              <p:nvPr/>
+            </p:nvSpPr>
+            <p:spPr>
+              <a:xfrm>
+                <a:off x="1638798" y="4231211"/>
+                <a:ext cx="8917200" cy="6868799"/>
+              </a:xfrm>
+              <a:prstGeom prst="rect">
+                <a:avLst/>
+              </a:prstGeom>
+              <a:noFill/>
+              <a:ln w="15875">
+                <a:solidFill>
+                  <a:srgbClr val="8C4FFF"/>
+                </a:solidFill>
+              </a:ln>
+            </p:spPr>
+            <p:style>
+              <a:lnRef idx="2">
+                <a:schemeClr val="accent1">
+                  <a:shade val="50000"/>
+                </a:schemeClr>
+              </a:lnRef>
+              <a:fillRef idx="1">
+                <a:schemeClr val="accent1"/>
+              </a:fillRef>
+              <a:effectRef idx="0">
+                <a:schemeClr val="accent1"/>
+              </a:effectRef>
+              <a:fontRef idx="minor">
+                <a:schemeClr val="lt1"/>
+              </a:fontRef>
+            </p:style>
+            <p:txBody>
+              <a:bodyPr lIns="502920" tIns="91441"/>
+              <a:lstStyle/>
+              <a:p>
+                <a:pPr>
+                  <a:defRPr/>
+                </a:pPr>
+                <a:r>
+                  <a:rPr lang="en-US" sz="1200" dirty="0">
+                    <a:ln w="0"/>
+                    <a:solidFill>
+                      <a:srgbClr val="8C4FFF"/>
+                    </a:solidFill>
+                    <a:latin typeface="Arial" panose="020B0604020202020204" pitchFamily="34" charset="0"/>
+                    <a:cs typeface="Arial" panose="020B0604020202020204" pitchFamily="34" charset="0"/>
+                  </a:rPr>
+                  <a:t>VPC</a:t>
+                </a:r>
+              </a:p>
+              <a:p>
+                <a:pPr>
+                  <a:defRPr/>
+                </a:pPr>
+                <a:r>
+                  <a:rPr lang="en-US" sz="1000" dirty="0">
+                    <a:ln w="0"/>
+                    <a:solidFill>
+                      <a:srgbClr val="8C4FFF"/>
+                    </a:solidFill>
+                    <a:latin typeface="Arial" panose="020B0604020202020204" pitchFamily="34" charset="0"/>
+                    <a:cs typeface="Arial" panose="020B0604020202020204" pitchFamily="34" charset="0"/>
+                  </a:rPr>
+                  <a:t>192.168.0.0/16</a:t>
+                </a:r>
+              </a:p>
+            </p:txBody>
+          </p:sp>
+          <p:pic>
+            <p:nvPicPr>
+              <p:cNvPr id="5" name="Graphic 4">
+                <a:extLst>
+                  <a:ext uri="{FF2B5EF4-FFF2-40B4-BE49-F238E27FC236}">
+                    <a16:creationId xmlns:a16="http://schemas.microsoft.com/office/drawing/2014/main" id="{1FA23E9C-56E0-EDEF-3BA5-69F970A74660}"/>
+                  </a:ext>
+                </a:extLst>
+              </p:cNvPr>
+              <p:cNvPicPr>
+                <a:picLocks noChangeAspect="1"/>
+              </p:cNvPicPr>
+              <p:nvPr/>
+            </p:nvPicPr>
+            <p:blipFill>
+              <a:blip r:embed="rId4">
+                <a:extLst>
+                  <a:ext uri="{96DAC541-7B7A-43D3-8B79-37D633B846F1}">
+                    <asvg:svgBlip xmlns:asvg="http://schemas.microsoft.com/office/drawing/2016/SVG/main" r:embed="rId5"/>
+                  </a:ext>
+                </a:extLst>
+              </a:blip>
+              <a:srcRect/>
+              <a:stretch/>
+            </p:blipFill>
+            <p:spPr>
+              <a:xfrm>
+                <a:off x="1638798" y="4226447"/>
+                <a:ext cx="381001" cy="381001"/>
+              </a:xfrm>
+              <a:prstGeom prst="rect">
+                <a:avLst/>
+              </a:prstGeom>
+            </p:spPr>
+          </p:pic>
+          <p:sp>
+            <p:nvSpPr>
+              <p:cNvPr id="6" name="Rectangle 5">
+                <a:extLst>
+                  <a:ext uri="{FF2B5EF4-FFF2-40B4-BE49-F238E27FC236}">
+                    <a16:creationId xmlns:a16="http://schemas.microsoft.com/office/drawing/2014/main" id="{8E5E65F0-3034-EBFC-AE51-6177A83926E6}"/>
+                  </a:ext>
+                </a:extLst>
+              </p:cNvPr>
+              <p:cNvSpPr/>
+              <p:nvPr/>
+            </p:nvSpPr>
+            <p:spPr>
+              <a:xfrm>
+                <a:off x="2055398" y="3728805"/>
+                <a:ext cx="8046000" cy="5907215"/>
+              </a:xfrm>
+              <a:prstGeom prst="rect">
+                <a:avLst/>
+              </a:prstGeom>
+              <a:noFill/>
+              <a:ln w="12700">
+                <a:solidFill>
+                  <a:srgbClr val="107FBE"/>
+                </a:solidFill>
+                <a:prstDash val="dash"/>
+              </a:ln>
+            </p:spPr>
+            <p:style>
+              <a:lnRef idx="2">
+                <a:schemeClr val="accent1">
+                  <a:shade val="50000"/>
+                </a:schemeClr>
+              </a:lnRef>
+              <a:fillRef idx="1">
+                <a:schemeClr val="accent1"/>
+              </a:fillRef>
+              <a:effectRef idx="0">
+                <a:schemeClr val="accent1"/>
+              </a:effectRef>
+              <a:fontRef idx="minor">
+                <a:schemeClr val="lt1"/>
+              </a:fontRef>
+            </p:style>
+            <p:txBody>
+              <a:bodyPr tIns="91441"/>
+              <a:lstStyle/>
+              <a:p>
+                <a:pPr>
+                  <a:defRPr/>
+                </a:pPr>
+                <a:endParaRPr lang="en-US" sz="1200" dirty="0">
+                  <a:solidFill>
+                    <a:schemeClr val="accent3"/>
+                  </a:solidFill>
+                </a:endParaRPr>
+              </a:p>
+            </p:txBody>
+          </p:sp>
+          <p:sp>
+            <p:nvSpPr>
+              <p:cNvPr id="7" name="Rectangle 37">
+                <a:extLst>
+                  <a:ext uri="{FF2B5EF4-FFF2-40B4-BE49-F238E27FC236}">
+                    <a16:creationId xmlns:a16="http://schemas.microsoft.com/office/drawing/2014/main" id="{44B260CA-12E5-6473-99CE-031C87B2AA1D}"/>
+                  </a:ext>
+                </a:extLst>
+              </p:cNvPr>
+              <p:cNvSpPr>
+                <a:spLocks noChangeArrowheads="1"/>
+              </p:cNvSpPr>
+              <p:nvPr/>
+            </p:nvSpPr>
+            <p:spPr bwMode="auto">
+              <a:xfrm>
+                <a:off x="5438737" y="3731563"/>
+                <a:ext cx="1279966" cy="430887"/>
+              </a:xfrm>
+              <a:prstGeom prst="rect">
+                <a:avLst/>
+              </a:prstGeom>
+              <a:noFill/>
+              <a:ln w="9525">
+                <a:noFill/>
+                <a:miter lim="800000"/>
+                <a:headEnd/>
+                <a:tailEnd/>
+              </a:ln>
+              <a:extLst>
+                <a:ext uri="{909E8E84-426E-40DD-AFC4-6F175D3DCCD1}">
+                  <a14:hiddenFill xmlns:a14="http://schemas.microsoft.com/office/drawing/2010/main">
+                    <a:solidFill>
+                      <a:srgbClr val="FFFFFF"/>
+                    </a:solidFill>
+                  </a14:hiddenFill>
+                </a:ext>
+              </a:extLst>
+            </p:spPr>
+            <p:txBody>
+              <a:bodyPr wrap="none">
+                <a:spAutoFit/>
+              </a:bodyPr>
+              <a:lstStyle>
+                <a:lvl1pPr>
+                  <a:defRPr>
+                    <a:solidFill>
+                      <a:schemeClr val="tx1"/>
+                    </a:solidFill>
+                    <a:latin typeface="Calibri" panose="020F0502020204030204" pitchFamily="34" charset="0"/>
+                  </a:defRPr>
+                </a:lvl1pPr>
+                <a:lvl2pPr marL="742950" indent="-285750">
+                  <a:defRPr>
+                    <a:solidFill>
+                      <a:schemeClr val="tx1"/>
+                    </a:solidFill>
+                    <a:latin typeface="Calibri" panose="020F0502020204030204" pitchFamily="34" charset="0"/>
+                  </a:defRPr>
+                </a:lvl2pPr>
+                <a:lvl3pPr marL="1143000" indent="-228600">
+                  <a:defRPr>
+                    <a:solidFill>
+                      <a:schemeClr val="tx1"/>
+                    </a:solidFill>
+                    <a:latin typeface="Calibri" panose="020F0502020204030204" pitchFamily="34" charset="0"/>
+                  </a:defRPr>
+                </a:lvl3pPr>
+                <a:lvl4pPr marL="1600200" indent="-228600">
+                  <a:defRPr>
+                    <a:solidFill>
+                      <a:schemeClr val="tx1"/>
+                    </a:solidFill>
+                    <a:latin typeface="Calibri" panose="020F0502020204030204" pitchFamily="34" charset="0"/>
+                  </a:defRPr>
+                </a:lvl4pPr>
+                <a:lvl5pPr marL="2057400" indent="-228600">
+                  <a:defRPr>
+                    <a:solidFill>
+                      <a:schemeClr val="tx1"/>
+                    </a:solidFill>
+                    <a:latin typeface="Calibri" panose="020F0502020204030204" pitchFamily="34" charset="0"/>
+                  </a:defRPr>
+                </a:lvl5pPr>
+                <a:lvl6pPr marL="2514600" indent="-228600" eaLnBrk="0" fontAlgn="base" hangingPunct="0">
+                  <a:spcBef>
+                    <a:spcPct val="0"/>
+                  </a:spcBef>
+                  <a:spcAft>
+                    <a:spcPct val="0"/>
+                  </a:spcAft>
+                  <a:defRPr>
+                    <a:solidFill>
+                      <a:schemeClr val="tx1"/>
+                    </a:solidFill>
+                    <a:latin typeface="Calibri" panose="020F0502020204030204" pitchFamily="34" charset="0"/>
+                  </a:defRPr>
+                </a:lvl6pPr>
+                <a:lvl7pPr marL="2971800" indent="-228600" eaLnBrk="0" fontAlgn="base" hangingPunct="0">
+                  <a:spcBef>
+                    <a:spcPct val="0"/>
+                  </a:spcBef>
+                  <a:spcAft>
+                    <a:spcPct val="0"/>
+                  </a:spcAft>
+                  <a:defRPr>
+                    <a:solidFill>
+                      <a:schemeClr val="tx1"/>
+                    </a:solidFill>
+                    <a:latin typeface="Calibri" panose="020F0502020204030204" pitchFamily="34" charset="0"/>
+                  </a:defRPr>
+                </a:lvl7pPr>
+                <a:lvl8pPr marL="3429000" indent="-228600" eaLnBrk="0" fontAlgn="base" hangingPunct="0">
+                  <a:spcBef>
+                    <a:spcPct val="0"/>
+                  </a:spcBef>
+                  <a:spcAft>
+                    <a:spcPct val="0"/>
+                  </a:spcAft>
+                  <a:defRPr>
+                    <a:solidFill>
+                      <a:schemeClr val="tx1"/>
+                    </a:solidFill>
+                    <a:latin typeface="Calibri" panose="020F0502020204030204" pitchFamily="34" charset="0"/>
+                  </a:defRPr>
+                </a:lvl8pPr>
+                <a:lvl9pPr marL="3886200" indent="-228600" eaLnBrk="0" fontAlgn="base" hangingPunct="0">
+                  <a:spcBef>
+                    <a:spcPct val="0"/>
+                  </a:spcBef>
+                  <a:spcAft>
+                    <a:spcPct val="0"/>
+                  </a:spcAft>
+                  <a:defRPr>
+                    <a:solidFill>
+                      <a:schemeClr val="tx1"/>
+                    </a:solidFill>
+                    <a:latin typeface="Calibri" panose="020F0502020204030204" pitchFamily="34" charset="0"/>
+                  </a:defRPr>
+                </a:lvl9pPr>
+              </a:lstStyle>
+              <a:p>
+                <a:pPr algn="ctr" eaLnBrk="1" hangingPunct="1"/>
+                <a:r>
+                  <a:rPr lang="en-US" altLang="en-US" sz="1200" dirty="0">
+                    <a:solidFill>
+                      <a:srgbClr val="0C7FBE"/>
+                    </a:solidFill>
+                    <a:latin typeface="Arial" panose="020B0604020202020204" pitchFamily="34" charset="0"/>
+                    <a:cs typeface="Arial" panose="020B0604020202020204" pitchFamily="34" charset="0"/>
+                  </a:rPr>
+                  <a:t>Availability zone</a:t>
+                </a:r>
+              </a:p>
+              <a:p>
+                <a:pPr algn="ctr" eaLnBrk="1" hangingPunct="1"/>
+                <a:r>
+                  <a:rPr lang="en-US" altLang="en-US" sz="1000" dirty="0">
+                    <a:solidFill>
+                      <a:srgbClr val="0C7FBE"/>
+                    </a:solidFill>
+                    <a:latin typeface="Arial" panose="020B0604020202020204" pitchFamily="34" charset="0"/>
+                    <a:cs typeface="Arial" panose="020B0604020202020204" pitchFamily="34" charset="0"/>
+                  </a:rPr>
+                  <a:t>eu-west-2a</a:t>
+                </a:r>
+              </a:p>
+            </p:txBody>
+          </p:sp>
+          <p:sp>
+            <p:nvSpPr>
+              <p:cNvPr id="8" name="Rectangle 7">
+                <a:extLst>
+                  <a:ext uri="{FF2B5EF4-FFF2-40B4-BE49-F238E27FC236}">
+                    <a16:creationId xmlns:a16="http://schemas.microsoft.com/office/drawing/2014/main" id="{DB765333-26F3-03F9-44B3-AEBC5003C6AE}"/>
+                  </a:ext>
+                </a:extLst>
+              </p:cNvPr>
+              <p:cNvSpPr/>
+              <p:nvPr/>
+            </p:nvSpPr>
+            <p:spPr>
+              <a:xfrm>
+                <a:off x="2158690" y="4763463"/>
+                <a:ext cx="5176800" cy="4775224"/>
+              </a:xfrm>
+              <a:prstGeom prst="rect">
+                <a:avLst/>
+              </a:prstGeom>
+              <a:solidFill>
+                <a:srgbClr val="7AA115">
+                  <a:alpha val="10000"/>
+                </a:srgbClr>
+              </a:solidFill>
+              <a:ln w="15875" cmpd="sng">
+                <a:noFill/>
+                <a:prstDash val="dash"/>
+              </a:ln>
+            </p:spPr>
+            <p:style>
+              <a:lnRef idx="2">
+                <a:schemeClr val="accent1">
+                  <a:shade val="50000"/>
+                </a:schemeClr>
+              </a:lnRef>
+              <a:fillRef idx="1">
+                <a:schemeClr val="accent1"/>
+              </a:fillRef>
+              <a:effectRef idx="0">
+                <a:schemeClr val="accent1"/>
+              </a:effectRef>
+              <a:fontRef idx="minor">
+                <a:schemeClr val="lt1"/>
+              </a:fontRef>
+            </p:style>
+            <p:txBody>
+              <a:bodyPr lIns="502920" tIns="91441" bIns="45720"/>
+              <a:lstStyle/>
+              <a:p>
+                <a:pPr>
+                  <a:defRPr/>
+                </a:pPr>
+                <a:r>
+                  <a:rPr lang="en-US" sz="1200" dirty="0">
+                    <a:solidFill>
+                      <a:srgbClr val="7AA115"/>
+                    </a:solidFill>
+                    <a:latin typeface="Arial" panose="020B0604020202020204" pitchFamily="34" charset="0"/>
+                    <a:cs typeface="Arial" panose="020B0604020202020204" pitchFamily="34" charset="0"/>
+                  </a:rPr>
+                  <a:t>Public subnet</a:t>
+                </a:r>
+              </a:p>
+              <a:p>
+                <a:pPr>
+                  <a:defRPr/>
+                </a:pPr>
+                <a:r>
+                  <a:rPr lang="en-US" sz="1000" dirty="0">
+                    <a:solidFill>
+                      <a:srgbClr val="7AA115"/>
+                    </a:solidFill>
+                    <a:latin typeface="Arial" panose="020B0604020202020204" pitchFamily="34" charset="0"/>
+                    <a:cs typeface="Arial" panose="020B0604020202020204" pitchFamily="34" charset="0"/>
+                  </a:rPr>
+                  <a:t>192.168.56.0/24</a:t>
+                </a:r>
+              </a:p>
+            </p:txBody>
+          </p:sp>
+          <p:pic>
+            <p:nvPicPr>
+              <p:cNvPr id="9" name="Graphic 8">
+                <a:extLst>
+                  <a:ext uri="{FF2B5EF4-FFF2-40B4-BE49-F238E27FC236}">
+                    <a16:creationId xmlns:a16="http://schemas.microsoft.com/office/drawing/2014/main" id="{7BC93939-202D-4F80-7A18-5DA7574C40E8}"/>
+                  </a:ext>
+                </a:extLst>
+              </p:cNvPr>
+              <p:cNvPicPr>
+                <a:picLocks noChangeAspect="1"/>
+              </p:cNvPicPr>
+              <p:nvPr/>
+            </p:nvPicPr>
+            <p:blipFill>
+              <a:blip r:embed="rId6">
+                <a:extLst>
+                  <a:ext uri="{96DAC541-7B7A-43D3-8B79-37D633B846F1}">
+                    <asvg:svgBlip xmlns:asvg="http://schemas.microsoft.com/office/drawing/2016/SVG/main" r:embed="rId7"/>
+                  </a:ext>
+                </a:extLst>
+              </a:blip>
+              <a:srcRect/>
+              <a:stretch/>
+            </p:blipFill>
+            <p:spPr>
+              <a:xfrm>
+                <a:off x="2158690" y="4762828"/>
+                <a:ext cx="381001" cy="381001"/>
+              </a:xfrm>
+              <a:prstGeom prst="rect">
+                <a:avLst/>
+              </a:prstGeom>
+            </p:spPr>
+          </p:pic>
+          <p:sp>
+            <p:nvSpPr>
+              <p:cNvPr id="10" name="Rectangle 9">
+                <a:extLst>
+                  <a:ext uri="{FF2B5EF4-FFF2-40B4-BE49-F238E27FC236}">
+                    <a16:creationId xmlns:a16="http://schemas.microsoft.com/office/drawing/2014/main" id="{8DA3D30F-B010-396A-E831-25711E9A1938}"/>
+                  </a:ext>
+                </a:extLst>
+              </p:cNvPr>
+              <p:cNvSpPr/>
+              <p:nvPr/>
+            </p:nvSpPr>
+            <p:spPr>
+              <a:xfrm>
+                <a:off x="7407937" y="4762828"/>
+                <a:ext cx="2588400" cy="4773600"/>
+              </a:xfrm>
+              <a:prstGeom prst="rect">
+                <a:avLst/>
+              </a:prstGeom>
+              <a:solidFill>
+                <a:srgbClr val="7AA115">
+                  <a:alpha val="10000"/>
+                </a:srgbClr>
+              </a:solidFill>
+              <a:ln w="15875" cmpd="sng">
+                <a:noFill/>
+                <a:prstDash val="dash"/>
+              </a:ln>
+            </p:spPr>
+            <p:style>
+              <a:lnRef idx="2">
+                <a:schemeClr val="accent1">
+                  <a:shade val="50000"/>
+                </a:schemeClr>
+              </a:lnRef>
+              <a:fillRef idx="1">
+                <a:schemeClr val="accent1"/>
+              </a:fillRef>
+              <a:effectRef idx="0">
+                <a:schemeClr val="accent1"/>
+              </a:effectRef>
+              <a:fontRef idx="minor">
+                <a:schemeClr val="lt1"/>
+              </a:fontRef>
+            </p:style>
+            <p:txBody>
+              <a:bodyPr lIns="502920" tIns="91441" bIns="45720"/>
+              <a:lstStyle/>
+              <a:p>
+                <a:pPr>
+                  <a:defRPr/>
+                </a:pPr>
+                <a:r>
+                  <a:rPr lang="en-US" sz="1200" dirty="0">
+                    <a:solidFill>
+                      <a:srgbClr val="7AA115"/>
+                    </a:solidFill>
+                    <a:latin typeface="Arial" panose="020B0604020202020204" pitchFamily="34" charset="0"/>
+                    <a:cs typeface="Arial" panose="020B0604020202020204" pitchFamily="34" charset="0"/>
+                  </a:rPr>
+                  <a:t>Private subnet</a:t>
+                </a:r>
+              </a:p>
+              <a:p>
+                <a:pPr>
+                  <a:defRPr/>
+                </a:pPr>
+                <a:r>
+                  <a:rPr lang="en-US" sz="1000" dirty="0">
+                    <a:solidFill>
+                      <a:srgbClr val="7AA115"/>
+                    </a:solidFill>
+                    <a:latin typeface="Arial" panose="020B0604020202020204" pitchFamily="34" charset="0"/>
+                    <a:cs typeface="Arial" panose="020B0604020202020204" pitchFamily="34" charset="0"/>
+                  </a:rPr>
+                  <a:t>192.168.100.0/24</a:t>
+                </a:r>
+              </a:p>
+            </p:txBody>
+          </p:sp>
+          <p:pic>
+            <p:nvPicPr>
+              <p:cNvPr id="11" name="Graphic 10">
+                <a:extLst>
+                  <a:ext uri="{FF2B5EF4-FFF2-40B4-BE49-F238E27FC236}">
+                    <a16:creationId xmlns:a16="http://schemas.microsoft.com/office/drawing/2014/main" id="{4267027E-E74A-C744-6128-FC0AD7484E3F}"/>
+                  </a:ext>
+                </a:extLst>
+              </p:cNvPr>
+              <p:cNvPicPr>
+                <a:picLocks noChangeAspect="1"/>
+              </p:cNvPicPr>
+              <p:nvPr/>
+            </p:nvPicPr>
+            <p:blipFill>
+              <a:blip r:embed="rId6">
+                <a:extLst>
+                  <a:ext uri="{96DAC541-7B7A-43D3-8B79-37D633B846F1}">
+                    <asvg:svgBlip xmlns:asvg="http://schemas.microsoft.com/office/drawing/2016/SVG/main" r:embed="rId7"/>
+                  </a:ext>
+                </a:extLst>
+              </a:blip>
+              <a:srcRect/>
+              <a:stretch/>
+            </p:blipFill>
+            <p:spPr>
+              <a:xfrm>
+                <a:off x="7407937" y="4762191"/>
+                <a:ext cx="381001" cy="381001"/>
+              </a:xfrm>
+              <a:prstGeom prst="rect">
+                <a:avLst/>
+              </a:prstGeom>
+            </p:spPr>
+          </p:pic>
+          <p:grpSp>
+            <p:nvGrpSpPr>
+              <p:cNvPr id="33" name="Group 32">
+                <a:extLst>
+                  <a:ext uri="{FF2B5EF4-FFF2-40B4-BE49-F238E27FC236}">
+                    <a16:creationId xmlns:a16="http://schemas.microsoft.com/office/drawing/2014/main" id="{30C4C4A0-7CC1-F09E-9FEA-C6CA2FB3A694}"/>
+                  </a:ext>
+                </a:extLst>
+              </p:cNvPr>
+              <p:cNvGrpSpPr/>
+              <p:nvPr/>
+            </p:nvGrpSpPr>
+            <p:grpSpPr>
+              <a:xfrm>
+                <a:off x="3598487" y="9959512"/>
+                <a:ext cx="2292350" cy="1040586"/>
+                <a:chOff x="3143388" y="8674133"/>
+                <a:chExt cx="2292350" cy="1040586"/>
+              </a:xfrm>
+            </p:grpSpPr>
+            <p:pic>
+              <p:nvPicPr>
+                <p:cNvPr id="16" name="Graphic 19">
+                  <a:extLst>
+                    <a:ext uri="{FF2B5EF4-FFF2-40B4-BE49-F238E27FC236}">
+                      <a16:creationId xmlns:a16="http://schemas.microsoft.com/office/drawing/2014/main" id="{5A86BFB6-2961-C67F-E359-E72C4776B0F1}"/>
+                    </a:ext>
+                  </a:extLst>
+                </p:cNvPr>
+                <p:cNvPicPr>
+                  <a:picLocks noChangeAspect="1" noChangeArrowheads="1"/>
+                </p:cNvPicPr>
+                <p:nvPr/>
+              </p:nvPicPr>
+              <p:blipFill>
+                <a:blip r:embed="rId8">
+                  <a:extLst>
+                    <a:ext uri="{96DAC541-7B7A-43D3-8B79-37D633B846F1}">
+                      <asvg:svgBlip xmlns:asvg="http://schemas.microsoft.com/office/drawing/2016/SVG/main" r:embed="rId9"/>
+                    </a:ext>
+                  </a:extLst>
+                </a:blip>
+                <a:srcRect/>
+                <a:stretch/>
+              </p:blipFill>
+              <p:spPr bwMode="auto">
+                <a:xfrm>
+                  <a:off x="3908563" y="8674133"/>
+                  <a:ext cx="762000" cy="762000"/>
+                </a:xfrm>
+                <a:prstGeom prst="rect">
+                  <a:avLst/>
+                </a:prstGeom>
+                <a:noFill/>
+                <a:ln>
+                  <a:noFill/>
+                </a:ln>
+                <a:extLst>
+                  <a:ext uri="{909E8E84-426E-40DD-AFC4-6F175D3DCCD1}">
+                    <a14:hiddenFill xmlns:a14="http://schemas.microsoft.com/office/drawing/2010/main">
+                      <a:solidFill>
+                        <a:srgbClr val="FFFFFF"/>
+                      </a:solidFill>
+                    </a14:hiddenFill>
+                  </a:ext>
+                  <a:ext uri="{91240B29-F687-4F45-9708-019B960494DF}">
+                    <a14:hiddenLine xmlns:a14="http://schemas.microsoft.com/office/drawing/2010/main" w="9525">
+                      <a:solidFill>
+                        <a:srgbClr val="000000"/>
+                      </a:solidFill>
+                      <a:miter lim="800000"/>
+                      <a:headEnd/>
+                      <a:tailEnd/>
+                    </a14:hiddenLine>
+                  </a:ext>
+                </a:extLst>
+              </p:spPr>
+            </p:pic>
+            <p:sp>
+              <p:nvSpPr>
+                <p:cNvPr id="17" name="TextBox 11">
+                  <a:extLst>
+                    <a:ext uri="{FF2B5EF4-FFF2-40B4-BE49-F238E27FC236}">
+                      <a16:creationId xmlns:a16="http://schemas.microsoft.com/office/drawing/2014/main" id="{E0A9E069-6E75-2D3E-D0BE-060790D40401}"/>
+                    </a:ext>
+                  </a:extLst>
+                </p:cNvPr>
+                <p:cNvSpPr txBox="1">
+                  <a:spLocks noChangeArrowheads="1"/>
+                </p:cNvSpPr>
+                <p:nvPr/>
+              </p:nvSpPr>
+              <p:spPr bwMode="auto">
+                <a:xfrm>
+                  <a:off x="3143388" y="9437720"/>
+                  <a:ext cx="2292350" cy="276999"/>
+                </a:xfrm>
+                <a:prstGeom prst="rect">
+                  <a:avLst/>
+                </a:prstGeom>
+                <a:noFill/>
+                <a:ln>
+                  <a:noFill/>
+                </a:ln>
+                <a:extLst>
+                  <a:ext uri="{909E8E84-426E-40DD-AFC4-6F175D3DCCD1}">
+                    <a14:hiddenFill xmlns:a14="http://schemas.microsoft.com/office/drawing/2010/main">
+                      <a:solidFill>
+                        <a:srgbClr val="FFFFFF"/>
+                      </a:solidFill>
+                    </a14:hiddenFill>
+                  </a:ext>
+                  <a:ext uri="{91240B29-F687-4F45-9708-019B960494DF}">
+                    <a14:hiddenLine xmlns:a14="http://schemas.microsoft.com/office/drawing/2010/main" w="9525">
+                      <a:solidFill>
+                        <a:srgbClr val="000000"/>
+                      </a:solidFill>
+                      <a:miter lim="800000"/>
+                      <a:headEnd/>
+                      <a:tailEnd/>
+                    </a14:hiddenLine>
+                  </a:ext>
+                </a:extLst>
+              </p:spPr>
+              <p:txBody>
+                <a:bodyPr>
+                  <a:spAutoFit/>
+                </a:bodyPr>
+                <a:lstStyle>
+                  <a:lvl1pPr>
+                    <a:defRPr>
+                      <a:solidFill>
+                        <a:schemeClr val="tx1"/>
+                      </a:solidFill>
+                      <a:latin typeface="Calibri" panose="020F0502020204030204" pitchFamily="34" charset="0"/>
+                    </a:defRPr>
+                  </a:lvl1pPr>
+                  <a:lvl2pPr marL="742950" indent="-285750">
+                    <a:defRPr>
+                      <a:solidFill>
+                        <a:schemeClr val="tx1"/>
+                      </a:solidFill>
+                      <a:latin typeface="Calibri" panose="020F0502020204030204" pitchFamily="34" charset="0"/>
+                    </a:defRPr>
+                  </a:lvl2pPr>
+                  <a:lvl3pPr marL="1143000" indent="-228600">
+                    <a:defRPr>
+                      <a:solidFill>
+                        <a:schemeClr val="tx1"/>
+                      </a:solidFill>
+                      <a:latin typeface="Calibri" panose="020F0502020204030204" pitchFamily="34" charset="0"/>
+                    </a:defRPr>
+                  </a:lvl3pPr>
+                  <a:lvl4pPr marL="1600200" indent="-228600">
+                    <a:defRPr>
+                      <a:solidFill>
+                        <a:schemeClr val="tx1"/>
+                      </a:solidFill>
+                      <a:latin typeface="Calibri" panose="020F0502020204030204" pitchFamily="34" charset="0"/>
+                    </a:defRPr>
+                  </a:lvl4pPr>
+                  <a:lvl5pPr marL="2057400" indent="-228600">
+                    <a:defRPr>
+                      <a:solidFill>
+                        <a:schemeClr val="tx1"/>
+                      </a:solidFill>
+                      <a:latin typeface="Calibri" panose="020F0502020204030204" pitchFamily="34" charset="0"/>
+                    </a:defRPr>
+                  </a:lvl5pPr>
+                  <a:lvl6pPr marL="2514600" indent="-228600" eaLnBrk="0" fontAlgn="base" hangingPunct="0">
+                    <a:spcBef>
+                      <a:spcPct val="0"/>
+                    </a:spcBef>
+                    <a:spcAft>
+                      <a:spcPct val="0"/>
+                    </a:spcAft>
+                    <a:defRPr>
+                      <a:solidFill>
+                        <a:schemeClr val="tx1"/>
+                      </a:solidFill>
+                      <a:latin typeface="Calibri" panose="020F0502020204030204" pitchFamily="34" charset="0"/>
+                    </a:defRPr>
+                  </a:lvl6pPr>
+                  <a:lvl7pPr marL="2971800" indent="-228600" eaLnBrk="0" fontAlgn="base" hangingPunct="0">
+                    <a:spcBef>
+                      <a:spcPct val="0"/>
+                    </a:spcBef>
+                    <a:spcAft>
+                      <a:spcPct val="0"/>
+                    </a:spcAft>
+                    <a:defRPr>
+                      <a:solidFill>
+                        <a:schemeClr val="tx1"/>
+                      </a:solidFill>
+                      <a:latin typeface="Calibri" panose="020F0502020204030204" pitchFamily="34" charset="0"/>
+                    </a:defRPr>
+                  </a:lvl7pPr>
+                  <a:lvl8pPr marL="3429000" indent="-228600" eaLnBrk="0" fontAlgn="base" hangingPunct="0">
+                    <a:spcBef>
+                      <a:spcPct val="0"/>
+                    </a:spcBef>
+                    <a:spcAft>
+                      <a:spcPct val="0"/>
+                    </a:spcAft>
+                    <a:defRPr>
+                      <a:solidFill>
+                        <a:schemeClr val="tx1"/>
+                      </a:solidFill>
+                      <a:latin typeface="Calibri" panose="020F0502020204030204" pitchFamily="34" charset="0"/>
+                    </a:defRPr>
+                  </a:lvl8pPr>
+                  <a:lvl9pPr marL="3886200" indent="-228600" eaLnBrk="0" fontAlgn="base" hangingPunct="0">
+                    <a:spcBef>
+                      <a:spcPct val="0"/>
+                    </a:spcBef>
+                    <a:spcAft>
+                      <a:spcPct val="0"/>
+                    </a:spcAft>
+                    <a:defRPr>
+                      <a:solidFill>
+                        <a:schemeClr val="tx1"/>
+                      </a:solidFill>
+                      <a:latin typeface="Calibri" panose="020F0502020204030204" pitchFamily="34" charset="0"/>
+                    </a:defRPr>
+                  </a:lvl9pPr>
+                </a:lstStyle>
+                <a:p>
+                  <a:pPr algn="ctr" eaLnBrk="1" hangingPunct="1"/>
+                  <a:r>
+                    <a:rPr lang="en-US" altLang="en-US" sz="1200" dirty="0">
+                      <a:solidFill>
+                        <a:srgbClr val="7AA115"/>
+                      </a:solidFill>
+                      <a:latin typeface="Arial" panose="020B0604020202020204" pitchFamily="34" charset="0"/>
+                      <a:ea typeface="Amazon Ember" panose="020B0603020204020204" pitchFamily="34" charset="0"/>
+                      <a:cs typeface="Arial" panose="020B0604020202020204" pitchFamily="34" charset="0"/>
+                    </a:rPr>
+                    <a:t>Amazon Elastic File System</a:t>
+                  </a:r>
+                </a:p>
+              </p:txBody>
+            </p:sp>
+          </p:grpSp>
+          <p:sp>
+            <p:nvSpPr>
+              <p:cNvPr id="29" name="Rectangle 28">
+                <a:extLst>
+                  <a:ext uri="{FF2B5EF4-FFF2-40B4-BE49-F238E27FC236}">
+                    <a16:creationId xmlns:a16="http://schemas.microsoft.com/office/drawing/2014/main" id="{49587B69-FAD1-D540-F046-1EFA52E28862}"/>
+                  </a:ext>
+                </a:extLst>
+              </p:cNvPr>
+              <p:cNvSpPr/>
+              <p:nvPr/>
+            </p:nvSpPr>
+            <p:spPr>
+              <a:xfrm>
+                <a:off x="3515340" y="8209000"/>
+                <a:ext cx="2467174" cy="911858"/>
+              </a:xfrm>
+              <a:prstGeom prst="rect">
+                <a:avLst/>
+              </a:prstGeom>
+              <a:solidFill>
+                <a:srgbClr val="8C4FFF">
+                  <a:alpha val="10000"/>
+                </a:srgbClr>
+              </a:solidFill>
+              <a:ln w="12700">
+                <a:solidFill>
+                  <a:srgbClr val="8C4FFF"/>
+                </a:solidFill>
+                <a:prstDash val="dash"/>
+              </a:ln>
+            </p:spPr>
+            <p:style>
+              <a:lnRef idx="2">
+                <a:schemeClr val="accent1">
+                  <a:shade val="50000"/>
+                </a:schemeClr>
+              </a:lnRef>
+              <a:fillRef idx="1">
+                <a:schemeClr val="accent1"/>
+              </a:fillRef>
+              <a:effectRef idx="0">
+                <a:schemeClr val="accent1"/>
+              </a:effectRef>
+              <a:fontRef idx="minor">
+                <a:schemeClr val="lt1"/>
+              </a:fontRef>
+            </p:style>
+            <p:txBody>
+              <a:bodyPr tIns="91441"/>
+              <a:lstStyle/>
+              <a:p>
+                <a:pPr>
+                  <a:defRPr/>
+                </a:pPr>
+                <a:endParaRPr lang="en-US" sz="1200" dirty="0">
+                  <a:solidFill>
+                    <a:schemeClr val="accent3"/>
+                  </a:solidFill>
+                </a:endParaRPr>
+              </a:p>
+            </p:txBody>
+          </p:sp>
+          <p:grpSp>
+            <p:nvGrpSpPr>
+              <p:cNvPr id="30" name="Group 29">
+                <a:extLst>
+                  <a:ext uri="{FF2B5EF4-FFF2-40B4-BE49-F238E27FC236}">
+                    <a16:creationId xmlns:a16="http://schemas.microsoft.com/office/drawing/2014/main" id="{0CDE88F1-019D-DA5E-9F3C-3F7AB9BDAFCD}"/>
+                  </a:ext>
+                </a:extLst>
+              </p:cNvPr>
+              <p:cNvGrpSpPr/>
+              <p:nvPr/>
+            </p:nvGrpSpPr>
+            <p:grpSpPr>
+              <a:xfrm>
+                <a:off x="4077501" y="8318467"/>
+                <a:ext cx="1342852" cy="734199"/>
+                <a:chOff x="9946877" y="3503004"/>
+                <a:chExt cx="1342852" cy="734199"/>
+              </a:xfrm>
+            </p:grpSpPr>
+            <p:sp>
+              <p:nvSpPr>
+                <p:cNvPr id="31" name="TextBox 18">
+                  <a:extLst>
+                    <a:ext uri="{FF2B5EF4-FFF2-40B4-BE49-F238E27FC236}">
+                      <a16:creationId xmlns:a16="http://schemas.microsoft.com/office/drawing/2014/main" id="{4DCEAED4-6118-2237-1A49-B41AA4192D3E}"/>
+                    </a:ext>
+                  </a:extLst>
+                </p:cNvPr>
+                <p:cNvSpPr txBox="1">
+                  <a:spLocks noChangeArrowheads="1"/>
+                </p:cNvSpPr>
+                <p:nvPr/>
+              </p:nvSpPr>
+              <p:spPr bwMode="auto">
+                <a:xfrm>
+                  <a:off x="9946877" y="3960204"/>
+                  <a:ext cx="1342852" cy="276999"/>
+                </a:xfrm>
+                <a:prstGeom prst="rect">
+                  <a:avLst/>
+                </a:prstGeom>
+                <a:noFill/>
+                <a:ln>
+                  <a:noFill/>
+                </a:ln>
+                <a:extLst>
+                  <a:ext uri="{909E8E84-426E-40DD-AFC4-6F175D3DCCD1}">
+                    <a14:hiddenFill xmlns:a14="http://schemas.microsoft.com/office/drawing/2010/main">
+                      <a:solidFill>
+                        <a:srgbClr val="FFFFFF"/>
+                      </a:solidFill>
+                    </a14:hiddenFill>
+                  </a:ext>
+                  <a:ext uri="{91240B29-F687-4F45-9708-019B960494DF}">
+                    <a14:hiddenLine xmlns:a14="http://schemas.microsoft.com/office/drawing/2010/main" w="9525">
+                      <a:solidFill>
+                        <a:srgbClr val="000000"/>
+                      </a:solidFill>
+                      <a:miter lim="800000"/>
+                      <a:headEnd/>
+                      <a:tailEnd/>
+                    </a14:hiddenLine>
+                  </a:ext>
+                </a:extLst>
+              </p:spPr>
+              <p:txBody>
+                <a:bodyPr wrap="square">
+                  <a:spAutoFit/>
+                </a:bodyPr>
+                <a:lstStyle>
+                  <a:lvl1pPr>
+                    <a:defRPr>
+                      <a:solidFill>
+                        <a:schemeClr val="tx1"/>
+                      </a:solidFill>
+                      <a:latin typeface="Calibri" panose="020F0502020204030204" pitchFamily="34" charset="0"/>
+                    </a:defRPr>
+                  </a:lvl1pPr>
+                  <a:lvl2pPr marL="742950" indent="-285750">
+                    <a:defRPr>
+                      <a:solidFill>
+                        <a:schemeClr val="tx1"/>
+                      </a:solidFill>
+                      <a:latin typeface="Calibri" panose="020F0502020204030204" pitchFamily="34" charset="0"/>
+                    </a:defRPr>
+                  </a:lvl2pPr>
+                  <a:lvl3pPr marL="1143000" indent="-228600">
+                    <a:defRPr>
+                      <a:solidFill>
+                        <a:schemeClr val="tx1"/>
+                      </a:solidFill>
+                      <a:latin typeface="Calibri" panose="020F0502020204030204" pitchFamily="34" charset="0"/>
+                    </a:defRPr>
+                  </a:lvl3pPr>
+                  <a:lvl4pPr marL="1600200" indent="-228600">
+                    <a:defRPr>
+                      <a:solidFill>
+                        <a:schemeClr val="tx1"/>
+                      </a:solidFill>
+                      <a:latin typeface="Calibri" panose="020F0502020204030204" pitchFamily="34" charset="0"/>
+                    </a:defRPr>
+                  </a:lvl4pPr>
+                  <a:lvl5pPr marL="2057400" indent="-228600">
+                    <a:defRPr>
+                      <a:solidFill>
+                        <a:schemeClr val="tx1"/>
+                      </a:solidFill>
+                      <a:latin typeface="Calibri" panose="020F0502020204030204" pitchFamily="34" charset="0"/>
+                    </a:defRPr>
+                  </a:lvl5pPr>
+                  <a:lvl6pPr marL="2514600" indent="-228600" eaLnBrk="0" fontAlgn="base" hangingPunct="0">
+                    <a:spcBef>
+                      <a:spcPct val="0"/>
+                    </a:spcBef>
+                    <a:spcAft>
+                      <a:spcPct val="0"/>
+                    </a:spcAft>
+                    <a:defRPr>
+                      <a:solidFill>
+                        <a:schemeClr val="tx1"/>
+                      </a:solidFill>
+                      <a:latin typeface="Calibri" panose="020F0502020204030204" pitchFamily="34" charset="0"/>
+                    </a:defRPr>
+                  </a:lvl6pPr>
+                  <a:lvl7pPr marL="2971800" indent="-228600" eaLnBrk="0" fontAlgn="base" hangingPunct="0">
+                    <a:spcBef>
+                      <a:spcPct val="0"/>
+                    </a:spcBef>
+                    <a:spcAft>
+                      <a:spcPct val="0"/>
+                    </a:spcAft>
+                    <a:defRPr>
+                      <a:solidFill>
+                        <a:schemeClr val="tx1"/>
+                      </a:solidFill>
+                      <a:latin typeface="Calibri" panose="020F0502020204030204" pitchFamily="34" charset="0"/>
+                    </a:defRPr>
+                  </a:lvl7pPr>
+                  <a:lvl8pPr marL="3429000" indent="-228600" eaLnBrk="0" fontAlgn="base" hangingPunct="0">
+                    <a:spcBef>
+                      <a:spcPct val="0"/>
+                    </a:spcBef>
+                    <a:spcAft>
+                      <a:spcPct val="0"/>
+                    </a:spcAft>
+                    <a:defRPr>
+                      <a:solidFill>
+                        <a:schemeClr val="tx1"/>
+                      </a:solidFill>
+                      <a:latin typeface="Calibri" panose="020F0502020204030204" pitchFamily="34" charset="0"/>
+                    </a:defRPr>
+                  </a:lvl8pPr>
+                  <a:lvl9pPr marL="3886200" indent="-228600" eaLnBrk="0" fontAlgn="base" hangingPunct="0">
+                    <a:spcBef>
+                      <a:spcPct val="0"/>
+                    </a:spcBef>
+                    <a:spcAft>
+                      <a:spcPct val="0"/>
+                    </a:spcAft>
+                    <a:defRPr>
+                      <a:solidFill>
+                        <a:schemeClr val="tx1"/>
+                      </a:solidFill>
+                      <a:latin typeface="Calibri" panose="020F0502020204030204" pitchFamily="34" charset="0"/>
+                    </a:defRPr>
+                  </a:lvl9pPr>
+                </a:lstStyle>
+                <a:p>
+                  <a:pPr algn="ctr" eaLnBrk="1" hangingPunct="1"/>
+                  <a:r>
+                    <a:rPr lang="en-US" altLang="en-US" sz="1200" dirty="0">
+                      <a:solidFill>
+                        <a:srgbClr val="8C4FFF"/>
+                      </a:solidFill>
+                      <a:latin typeface="Arial" panose="020B0604020202020204" pitchFamily="34" charset="0"/>
+                      <a:ea typeface="Amazon Ember" panose="020B0603020204020204" pitchFamily="34" charset="0"/>
+                      <a:cs typeface="Arial" panose="020B0604020202020204" pitchFamily="34" charset="0"/>
+                    </a:rPr>
+                    <a:t>Mount target</a:t>
+                  </a:r>
+                </a:p>
+              </p:txBody>
+            </p:sp>
+            <p:pic>
+              <p:nvPicPr>
+                <p:cNvPr id="32" name="Graphic 31">
+                  <a:extLst>
+                    <a:ext uri="{FF2B5EF4-FFF2-40B4-BE49-F238E27FC236}">
+                      <a16:creationId xmlns:a16="http://schemas.microsoft.com/office/drawing/2014/main" id="{FB77860A-92B6-62D4-1A81-E7FBD0FC0B4A}"/>
+                    </a:ext>
+                  </a:extLst>
+                </p:cNvPr>
+                <p:cNvPicPr>
+                  <a:picLocks noChangeAspect="1"/>
+                </p:cNvPicPr>
+                <p:nvPr/>
+              </p:nvPicPr>
+              <p:blipFill>
+                <a:blip r:embed="rId10">
+                  <a:extLst>
+                    <a:ext uri="{96DAC541-7B7A-43D3-8B79-37D633B846F1}">
+                      <asvg:svgBlip xmlns:asvg="http://schemas.microsoft.com/office/drawing/2016/SVG/main" r:embed="rId11"/>
+                    </a:ext>
+                  </a:extLst>
+                </a:blip>
+                <a:stretch>
+                  <a:fillRect/>
+                </a:stretch>
+              </p:blipFill>
+              <p:spPr>
+                <a:xfrm>
+                  <a:off x="10385002" y="3503004"/>
+                  <a:ext cx="457200" cy="457200"/>
+                </a:xfrm>
+                <a:prstGeom prst="rect">
+                  <a:avLst/>
+                </a:prstGeom>
+              </p:spPr>
+            </p:pic>
+          </p:grpSp>
+          <p:cxnSp>
+            <p:nvCxnSpPr>
+              <p:cNvPr id="34" name="Straight Arrow Connector 33">
+                <a:extLst>
+                  <a:ext uri="{FF2B5EF4-FFF2-40B4-BE49-F238E27FC236}">
+                    <a16:creationId xmlns:a16="http://schemas.microsoft.com/office/drawing/2014/main" id="{096AC69F-062F-8D98-52A8-0B0B6E2A2787}"/>
+                  </a:ext>
+                </a:extLst>
+              </p:cNvPr>
+              <p:cNvCxnSpPr>
+                <a:cxnSpLocks/>
+                <a:endCxn id="29" idx="2"/>
+              </p:cNvCxnSpPr>
+              <p:nvPr/>
+            </p:nvCxnSpPr>
+            <p:spPr>
+              <a:xfrm flipV="1">
+                <a:off x="4748927" y="9120858"/>
+                <a:ext cx="0" cy="838654"/>
+              </a:xfrm>
+              <a:prstGeom prst="straightConnector1">
+                <a:avLst/>
+              </a:prstGeom>
+              <a:ln w="15875">
+                <a:solidFill>
+                  <a:schemeClr val="tx1"/>
+                </a:solidFill>
+                <a:headEnd type="none" w="med" len="sm"/>
+                <a:tailEnd type="none" w="med" len="sm"/>
+              </a:ln>
+            </p:spPr>
+            <p:style>
+              <a:lnRef idx="1">
+                <a:schemeClr val="accent1"/>
+              </a:lnRef>
+              <a:fillRef idx="0">
+                <a:schemeClr val="accent1"/>
+              </a:fillRef>
+              <a:effectRef idx="0">
+                <a:schemeClr val="accent1"/>
+              </a:effectRef>
+              <a:fontRef idx="minor">
+                <a:schemeClr val="tx1"/>
+              </a:fontRef>
+            </p:style>
+          </p:cxnSp>
+          <p:sp>
+            <p:nvSpPr>
+              <p:cNvPr id="37" name="Freeform 36">
+                <a:extLst>
+                  <a:ext uri="{FF2B5EF4-FFF2-40B4-BE49-F238E27FC236}">
+                    <a16:creationId xmlns:a16="http://schemas.microsoft.com/office/drawing/2014/main" id="{9837BD43-6E54-7B17-C665-7CC7D0AF68B5}"/>
+                  </a:ext>
+                </a:extLst>
+              </p:cNvPr>
+              <p:cNvSpPr/>
+              <p:nvPr/>
+            </p:nvSpPr>
+            <p:spPr bwMode="auto">
+              <a:xfrm>
+                <a:off x="5982515" y="6892820"/>
+                <a:ext cx="1041312" cy="1757435"/>
+              </a:xfrm>
+              <a:custGeom>
+                <a:avLst/>
+                <a:gdLst>
+                  <a:gd name="connsiteX0" fmla="*/ 0 w 622300"/>
+                  <a:gd name="connsiteY0" fmla="*/ 0 h 1574800"/>
+                  <a:gd name="connsiteX1" fmla="*/ 622300 w 622300"/>
+                  <a:gd name="connsiteY1" fmla="*/ 0 h 1574800"/>
+                  <a:gd name="connsiteX2" fmla="*/ 622300 w 622300"/>
+                  <a:gd name="connsiteY2" fmla="*/ 1574800 h 1574800"/>
+                  <a:gd name="connsiteX3" fmla="*/ 482600 w 622300"/>
+                  <a:gd name="connsiteY3" fmla="*/ 1574800 h 1574800"/>
+                  <a:gd name="connsiteX4" fmla="*/ 0 w 622300"/>
+                  <a:gd name="connsiteY4" fmla="*/ 1574800 h 1574800"/>
+                </a:gdLst>
+                <a:ahLst/>
+                <a:cxnLst>
+                  <a:cxn ang="0">
+                    <a:pos x="connsiteX0" y="connsiteY0"/>
+                  </a:cxn>
+                  <a:cxn ang="0">
+                    <a:pos x="connsiteX1" y="connsiteY1"/>
+                  </a:cxn>
+                  <a:cxn ang="0">
+                    <a:pos x="connsiteX2" y="connsiteY2"/>
+                  </a:cxn>
+                  <a:cxn ang="0">
+                    <a:pos x="connsiteX3" y="connsiteY3"/>
+                  </a:cxn>
+                  <a:cxn ang="0">
+                    <a:pos x="connsiteX4" y="connsiteY4"/>
+                  </a:cxn>
+                </a:cxnLst>
+                <a:rect l="l" t="t" r="r" b="b"/>
+                <a:pathLst>
+                  <a:path w="622300" h="1574800">
+                    <a:moveTo>
+                      <a:pt x="0" y="0"/>
+                    </a:moveTo>
+                    <a:lnTo>
+                      <a:pt x="622300" y="0"/>
+                    </a:lnTo>
+                    <a:lnTo>
+                      <a:pt x="622300" y="1574800"/>
+                    </a:lnTo>
+                    <a:lnTo>
+                      <a:pt x="482600" y="1574800"/>
+                    </a:lnTo>
+                    <a:lnTo>
+                      <a:pt x="0" y="1574800"/>
+                    </a:lnTo>
+                  </a:path>
+                </a:pathLst>
+              </a:custGeom>
+              <a:noFill/>
+              <a:ln w="15875">
+                <a:solidFill>
+                  <a:schemeClr val="tx1"/>
+                </a:solidFill>
+              </a:ln>
+            </p:spPr>
+            <p:style>
+              <a:lnRef idx="2">
+                <a:schemeClr val="accent1">
+                  <a:shade val="50000"/>
+                </a:schemeClr>
+              </a:lnRef>
+              <a:fillRef idx="1">
+                <a:schemeClr val="accent1"/>
+              </a:fillRef>
+              <a:effectRef idx="0">
+                <a:schemeClr val="accent1"/>
+              </a:effectRef>
+              <a:fontRef idx="minor">
+                <a:schemeClr val="lt1"/>
+              </a:fontRef>
+            </p:style>
+            <p:txBody>
+              <a:bodyPr anchor="ctr"/>
+              <a:lstStyle/>
+              <a:p>
+                <a:pPr algn="ctr" eaLnBrk="1" fontAlgn="auto" hangingPunct="1">
+                  <a:spcBef>
+                    <a:spcPts val="0"/>
+                  </a:spcBef>
+                  <a:spcAft>
+                    <a:spcPts val="0"/>
+                  </a:spcAft>
+                  <a:defRPr/>
+                </a:pPr>
+                <a:endParaRPr lang="en-US" dirty="0"/>
+              </a:p>
+            </p:txBody>
+          </p:sp>
+          <p:sp>
+            <p:nvSpPr>
+              <p:cNvPr id="40" name="Rectangle 39">
+                <a:extLst>
+                  <a:ext uri="{FF2B5EF4-FFF2-40B4-BE49-F238E27FC236}">
+                    <a16:creationId xmlns:a16="http://schemas.microsoft.com/office/drawing/2014/main" id="{D056ED1E-EE17-8D6E-FCB9-B06E9D7B8260}"/>
+                  </a:ext>
+                </a:extLst>
+              </p:cNvPr>
+              <p:cNvSpPr/>
+              <p:nvPr/>
+            </p:nvSpPr>
+            <p:spPr>
+              <a:xfrm>
+                <a:off x="2550577" y="5508267"/>
+                <a:ext cx="4402760" cy="2430533"/>
+              </a:xfrm>
+              <a:prstGeom prst="rect">
+                <a:avLst/>
+              </a:prstGeom>
+              <a:solidFill>
+                <a:srgbClr val="ED7102">
+                  <a:alpha val="10000"/>
+                </a:srgbClr>
+              </a:solidFill>
+              <a:ln w="15875" cmpd="sng">
+                <a:solidFill>
+                  <a:srgbClr val="E1700F"/>
+                </a:solidFill>
+                <a:prstDash val="solid"/>
+              </a:ln>
+            </p:spPr>
+            <p:style>
+              <a:lnRef idx="2">
+                <a:schemeClr val="accent1">
+                  <a:shade val="50000"/>
+                </a:schemeClr>
+              </a:lnRef>
+              <a:fillRef idx="1">
+                <a:schemeClr val="accent1"/>
+              </a:fillRef>
+              <a:effectRef idx="0">
+                <a:schemeClr val="accent1"/>
+              </a:effectRef>
+              <a:fontRef idx="minor">
+                <a:schemeClr val="lt1"/>
+              </a:fontRef>
+            </p:style>
+            <p:txBody>
+              <a:bodyPr lIns="502920" tIns="91441" bIns="45720"/>
+              <a:lstStyle/>
+              <a:p>
+                <a:pPr>
+                  <a:defRPr/>
+                </a:pPr>
+                <a:r>
+                  <a:rPr lang="en-US" sz="600" dirty="0">
+                    <a:solidFill>
+                      <a:srgbClr val="7AA115"/>
+                    </a:solidFill>
+                    <a:latin typeface="Arial" panose="020B0604020202020204" pitchFamily="34" charset="0"/>
+                    <a:cs typeface="Arial" panose="020B0604020202020204" pitchFamily="34" charset="0"/>
+                  </a:rPr>
+                  <a:t>   </a:t>
+                </a:r>
+              </a:p>
+              <a:p>
+                <a:pPr>
+                  <a:defRPr/>
+                </a:pPr>
+                <a:r>
+                  <a:rPr lang="en-US" sz="1200" dirty="0">
+                    <a:solidFill>
+                      <a:srgbClr val="E1700F"/>
+                    </a:solidFill>
+                    <a:latin typeface="Arial" panose="020B0604020202020204" pitchFamily="34" charset="0"/>
+                    <a:cs typeface="Arial" panose="020B0604020202020204" pitchFamily="34" charset="0"/>
+                  </a:rPr>
+                  <a:t>  Amazon EC2</a:t>
+                </a:r>
+              </a:p>
+            </p:txBody>
+          </p:sp>
+          <p:sp>
+            <p:nvSpPr>
+              <p:cNvPr id="41" name="Freeform 40">
+                <a:extLst>
+                  <a:ext uri="{FF2B5EF4-FFF2-40B4-BE49-F238E27FC236}">
+                    <a16:creationId xmlns:a16="http://schemas.microsoft.com/office/drawing/2014/main" id="{4ABFE5DF-13A8-1A77-0B8F-87A02F39DF19}"/>
+                  </a:ext>
+                </a:extLst>
+              </p:cNvPr>
+              <p:cNvSpPr/>
+              <p:nvPr/>
+            </p:nvSpPr>
+            <p:spPr bwMode="auto">
+              <a:xfrm rot="10800000">
+                <a:off x="2474029" y="6912328"/>
+                <a:ext cx="1041311" cy="1757435"/>
+              </a:xfrm>
+              <a:custGeom>
+                <a:avLst/>
+                <a:gdLst>
+                  <a:gd name="connsiteX0" fmla="*/ 0 w 622300"/>
+                  <a:gd name="connsiteY0" fmla="*/ 0 h 1574800"/>
+                  <a:gd name="connsiteX1" fmla="*/ 622300 w 622300"/>
+                  <a:gd name="connsiteY1" fmla="*/ 0 h 1574800"/>
+                  <a:gd name="connsiteX2" fmla="*/ 622300 w 622300"/>
+                  <a:gd name="connsiteY2" fmla="*/ 1574800 h 1574800"/>
+                  <a:gd name="connsiteX3" fmla="*/ 482600 w 622300"/>
+                  <a:gd name="connsiteY3" fmla="*/ 1574800 h 1574800"/>
+                  <a:gd name="connsiteX4" fmla="*/ 0 w 622300"/>
+                  <a:gd name="connsiteY4" fmla="*/ 1574800 h 1574800"/>
+                </a:gdLst>
+                <a:ahLst/>
+                <a:cxnLst>
+                  <a:cxn ang="0">
+                    <a:pos x="connsiteX0" y="connsiteY0"/>
+                  </a:cxn>
+                  <a:cxn ang="0">
+                    <a:pos x="connsiteX1" y="connsiteY1"/>
+                  </a:cxn>
+                  <a:cxn ang="0">
+                    <a:pos x="connsiteX2" y="connsiteY2"/>
+                  </a:cxn>
+                  <a:cxn ang="0">
+                    <a:pos x="connsiteX3" y="connsiteY3"/>
+                  </a:cxn>
+                  <a:cxn ang="0">
+                    <a:pos x="connsiteX4" y="connsiteY4"/>
+                  </a:cxn>
+                </a:cxnLst>
+                <a:rect l="l" t="t" r="r" b="b"/>
+                <a:pathLst>
+                  <a:path w="622300" h="1574800">
+                    <a:moveTo>
+                      <a:pt x="0" y="0"/>
+                    </a:moveTo>
+                    <a:lnTo>
+                      <a:pt x="622300" y="0"/>
+                    </a:lnTo>
+                    <a:lnTo>
+                      <a:pt x="622300" y="1574800"/>
+                    </a:lnTo>
+                    <a:lnTo>
+                      <a:pt x="482600" y="1574800"/>
+                    </a:lnTo>
+                    <a:lnTo>
+                      <a:pt x="0" y="1574800"/>
+                    </a:lnTo>
+                  </a:path>
+                </a:pathLst>
+              </a:custGeom>
+              <a:noFill/>
+              <a:ln w="15875">
+                <a:solidFill>
+                  <a:schemeClr val="tx1"/>
+                </a:solidFill>
+              </a:ln>
+            </p:spPr>
+            <p:style>
+              <a:lnRef idx="2">
+                <a:schemeClr val="accent1">
+                  <a:shade val="50000"/>
+                </a:schemeClr>
+              </a:lnRef>
+              <a:fillRef idx="1">
+                <a:schemeClr val="accent1"/>
+              </a:fillRef>
+              <a:effectRef idx="0">
+                <a:schemeClr val="accent1"/>
+              </a:effectRef>
+              <a:fontRef idx="minor">
+                <a:schemeClr val="lt1"/>
+              </a:fontRef>
+            </p:style>
+            <p:txBody>
+              <a:bodyPr anchor="ctr"/>
+              <a:lstStyle/>
+              <a:p>
+                <a:pPr algn="ctr" eaLnBrk="1" fontAlgn="auto" hangingPunct="1">
+                  <a:spcBef>
+                    <a:spcPts val="0"/>
+                  </a:spcBef>
+                  <a:spcAft>
+                    <a:spcPts val="0"/>
+                  </a:spcAft>
+                  <a:defRPr/>
+                </a:pPr>
+                <a:endParaRPr lang="en-US" dirty="0"/>
+              </a:p>
+            </p:txBody>
+          </p:sp>
+          <p:pic>
+            <p:nvPicPr>
+              <p:cNvPr id="44" name="Graphic 5">
+                <a:extLst>
+                  <a:ext uri="{FF2B5EF4-FFF2-40B4-BE49-F238E27FC236}">
+                    <a16:creationId xmlns:a16="http://schemas.microsoft.com/office/drawing/2014/main" id="{16E1A031-48BA-E77D-5FA2-9972DBDFC107}"/>
                   </a:ext>
                 </a:extLst>
               </p:cNvPr>
@@ -3705,10 +4633,10 @@
               <p:nvPr/>
             </p:nvPicPr>
             <p:blipFill>
-              <a:blip r:embed="rId8">
+              <a:blip r:embed="rId12">
                 <a:extLst>
                   <a:ext uri="{96DAC541-7B7A-43D3-8B79-37D633B846F1}">
-                    <asvg:svgBlip xmlns:asvg="http://schemas.microsoft.com/office/drawing/2016/SVG/main" r:embed="rId9"/>
+                    <asvg:svgBlip xmlns:asvg="http://schemas.microsoft.com/office/drawing/2016/SVG/main" r:embed="rId13"/>
                   </a:ext>
                 </a:extLst>
               </a:blip>
@@ -3717,8 +4645,8 @@
             </p:blipFill>
             <p:spPr bwMode="auto">
               <a:xfrm>
-                <a:off x="3908563" y="8674133"/>
-                <a:ext cx="762000" cy="762000"/>
+                <a:off x="2550576" y="5503202"/>
+                <a:ext cx="533400" cy="533400"/>
               </a:xfrm>
               <a:prstGeom prst="rect">
                 <a:avLst/>
@@ -3750,10 +4678,10 @@
           </p:pic>
           <p:sp>
             <p:nvSpPr>
-              <p:cNvPr id="17" name="TextBox 11">
+              <p:cNvPr id="49" name="TextBox 16">
                 <a:extLst>
                   <a:ext uri="{FF2B5EF4-FFF2-40B4-BE49-F238E27FC236}">
-                    <a16:creationId xmlns:a16="http://schemas.microsoft.com/office/drawing/2014/main" id="{E0A9E069-6E75-2D3E-D0BE-060790D40401}"/>
+                    <a16:creationId xmlns:a16="http://schemas.microsoft.com/office/drawing/2014/main" id="{384B556A-34DC-59DF-9A2D-4C2CCBC94246}"/>
                   </a:ext>
                 </a:extLst>
               </p:cNvPr>
@@ -3764,8 +4692,605 @@
             </p:nvSpPr>
             <p:spPr bwMode="auto">
               <a:xfrm>
-                <a:off x="3143388" y="9437720"/>
-                <a:ext cx="2292350" cy="276999"/>
+                <a:off x="3182308" y="7121921"/>
+                <a:ext cx="1267968" cy="584775"/>
+              </a:xfrm>
+              <a:prstGeom prst="rect">
+                <a:avLst/>
+              </a:prstGeom>
+              <a:noFill/>
+              <a:ln>
+                <a:noFill/>
+              </a:ln>
+              <a:extLst>
+                <a:ext uri="{909E8E84-426E-40DD-AFC4-6F175D3DCCD1}">
+                  <a14:hiddenFill xmlns:a14="http://schemas.microsoft.com/office/drawing/2010/main">
+                    <a:solidFill>
+                      <a:srgbClr val="FFFFFF"/>
+                    </a:solidFill>
+                  </a14:hiddenFill>
+                </a:ext>
+                <a:ext uri="{91240B29-F687-4F45-9708-019B960494DF}">
+                  <a14:hiddenLine xmlns:a14="http://schemas.microsoft.com/office/drawing/2010/main" w="9525">
+                    <a:solidFill>
+                      <a:srgbClr val="000000"/>
+                    </a:solidFill>
+                    <a:miter lim="800000"/>
+                    <a:headEnd/>
+                    <a:tailEnd/>
+                  </a14:hiddenLine>
+                </a:ext>
+              </a:extLst>
+            </p:spPr>
+            <p:txBody>
+              <a:bodyPr wrap="square" lIns="0" rIns="0">
+                <a:spAutoFit/>
+              </a:bodyPr>
+              <a:lstStyle>
+                <a:lvl1pPr>
+                  <a:defRPr>
+                    <a:solidFill>
+                      <a:schemeClr val="tx1"/>
+                    </a:solidFill>
+                    <a:latin typeface="Calibri" panose="020F0502020204030204" pitchFamily="34" charset="0"/>
+                  </a:defRPr>
+                </a:lvl1pPr>
+                <a:lvl2pPr marL="742950" indent="-285750">
+                  <a:defRPr>
+                    <a:solidFill>
+                      <a:schemeClr val="tx1"/>
+                    </a:solidFill>
+                    <a:latin typeface="Calibri" panose="020F0502020204030204" pitchFamily="34" charset="0"/>
+                  </a:defRPr>
+                </a:lvl2pPr>
+                <a:lvl3pPr marL="1143000" indent="-228600">
+                  <a:defRPr>
+                    <a:solidFill>
+                      <a:schemeClr val="tx1"/>
+                    </a:solidFill>
+                    <a:latin typeface="Calibri" panose="020F0502020204030204" pitchFamily="34" charset="0"/>
+                  </a:defRPr>
+                </a:lvl3pPr>
+                <a:lvl4pPr marL="1600200" indent="-228600">
+                  <a:defRPr>
+                    <a:solidFill>
+                      <a:schemeClr val="tx1"/>
+                    </a:solidFill>
+                    <a:latin typeface="Calibri" panose="020F0502020204030204" pitchFamily="34" charset="0"/>
+                  </a:defRPr>
+                </a:lvl4pPr>
+                <a:lvl5pPr marL="2057400" indent="-228600">
+                  <a:defRPr>
+                    <a:solidFill>
+                      <a:schemeClr val="tx1"/>
+                    </a:solidFill>
+                    <a:latin typeface="Calibri" panose="020F0502020204030204" pitchFamily="34" charset="0"/>
+                  </a:defRPr>
+                </a:lvl5pPr>
+                <a:lvl6pPr marL="2514600" indent="-228600" eaLnBrk="0" fontAlgn="base" hangingPunct="0">
+                  <a:spcBef>
+                    <a:spcPct val="0"/>
+                  </a:spcBef>
+                  <a:spcAft>
+                    <a:spcPct val="0"/>
+                  </a:spcAft>
+                  <a:defRPr>
+                    <a:solidFill>
+                      <a:schemeClr val="tx1"/>
+                    </a:solidFill>
+                    <a:latin typeface="Calibri" panose="020F0502020204030204" pitchFamily="34" charset="0"/>
+                  </a:defRPr>
+                </a:lvl6pPr>
+                <a:lvl7pPr marL="2971800" indent="-228600" eaLnBrk="0" fontAlgn="base" hangingPunct="0">
+                  <a:spcBef>
+                    <a:spcPct val="0"/>
+                  </a:spcBef>
+                  <a:spcAft>
+                    <a:spcPct val="0"/>
+                  </a:spcAft>
+                  <a:defRPr>
+                    <a:solidFill>
+                      <a:schemeClr val="tx1"/>
+                    </a:solidFill>
+                    <a:latin typeface="Calibri" panose="020F0502020204030204" pitchFamily="34" charset="0"/>
+                  </a:defRPr>
+                </a:lvl7pPr>
+                <a:lvl8pPr marL="3429000" indent="-228600" eaLnBrk="0" fontAlgn="base" hangingPunct="0">
+                  <a:spcBef>
+                    <a:spcPct val="0"/>
+                  </a:spcBef>
+                  <a:spcAft>
+                    <a:spcPct val="0"/>
+                  </a:spcAft>
+                  <a:defRPr>
+                    <a:solidFill>
+                      <a:schemeClr val="tx1"/>
+                    </a:solidFill>
+                    <a:latin typeface="Calibri" panose="020F0502020204030204" pitchFamily="34" charset="0"/>
+                  </a:defRPr>
+                </a:lvl8pPr>
+                <a:lvl9pPr marL="3886200" indent="-228600" eaLnBrk="0" fontAlgn="base" hangingPunct="0">
+                  <a:spcBef>
+                    <a:spcPct val="0"/>
+                  </a:spcBef>
+                  <a:spcAft>
+                    <a:spcPct val="0"/>
+                  </a:spcAft>
+                  <a:defRPr>
+                    <a:solidFill>
+                      <a:schemeClr val="tx1"/>
+                    </a:solidFill>
+                    <a:latin typeface="Calibri" panose="020F0502020204030204" pitchFamily="34" charset="0"/>
+                  </a:defRPr>
+                </a:lvl9pPr>
+              </a:lstStyle>
+              <a:p>
+                <a:pPr algn="ctr" eaLnBrk="1" hangingPunct="1"/>
+                <a:r>
+                  <a:rPr lang="en-US" altLang="en-US" sz="1200" dirty="0">
+                    <a:solidFill>
+                      <a:srgbClr val="E1700F"/>
+                    </a:solidFill>
+                    <a:latin typeface="Arial" panose="020B0604020202020204" pitchFamily="34" charset="0"/>
+                    <a:ea typeface="Amazon Ember" panose="020B0603020204020204" pitchFamily="34" charset="0"/>
+                    <a:cs typeface="Arial" panose="020B0604020202020204" pitchFamily="34" charset="0"/>
+                  </a:rPr>
+                  <a:t>t3.medium</a:t>
+                </a:r>
+              </a:p>
+              <a:p>
+                <a:pPr algn="ctr" eaLnBrk="1" hangingPunct="1"/>
+                <a:r>
+                  <a:rPr lang="en-US" altLang="en-US" sz="1000" dirty="0">
+                    <a:solidFill>
+                      <a:srgbClr val="E1700F"/>
+                    </a:solidFill>
+                    <a:latin typeface="Arial" panose="020B0604020202020204" pitchFamily="34" charset="0"/>
+                    <a:ea typeface="Amazon Ember" panose="020B0603020204020204" pitchFamily="34" charset="0"/>
+                    <a:cs typeface="Arial" panose="020B0604020202020204" pitchFamily="34" charset="0"/>
+                  </a:rPr>
+                  <a:t>Container Service</a:t>
+                </a:r>
+              </a:p>
+              <a:p>
+                <a:pPr algn="ctr" eaLnBrk="1" hangingPunct="1"/>
+                <a:r>
+                  <a:rPr lang="en-US" altLang="en-US" sz="1000" dirty="0">
+                    <a:solidFill>
+                      <a:srgbClr val="E1700F"/>
+                    </a:solidFill>
+                    <a:latin typeface="Arial" panose="020B0604020202020204" pitchFamily="34" charset="0"/>
+                    <a:ea typeface="Amazon Ember" panose="020B0603020204020204" pitchFamily="34" charset="0"/>
+                    <a:cs typeface="Arial" panose="020B0604020202020204" pitchFamily="34" charset="0"/>
+                  </a:rPr>
+                  <a:t>192.168.56.14</a:t>
+                </a:r>
+              </a:p>
+            </p:txBody>
+          </p:sp>
+          <p:pic>
+            <p:nvPicPr>
+              <p:cNvPr id="50" name="Graphic 49">
+                <a:extLst>
+                  <a:ext uri="{FF2B5EF4-FFF2-40B4-BE49-F238E27FC236}">
+                    <a16:creationId xmlns:a16="http://schemas.microsoft.com/office/drawing/2014/main" id="{5BCAF775-38A0-2292-364B-1BCA6DFB6A35}"/>
+                  </a:ext>
+                </a:extLst>
+              </p:cNvPr>
+              <p:cNvPicPr>
+                <a:picLocks noChangeAspect="1"/>
+              </p:cNvPicPr>
+              <p:nvPr/>
+            </p:nvPicPr>
+            <p:blipFill>
+              <a:blip r:embed="rId14">
+                <a:extLst>
+                  <a:ext uri="{96DAC541-7B7A-43D3-8B79-37D633B846F1}">
+                    <asvg:svgBlip xmlns:asvg="http://schemas.microsoft.com/office/drawing/2016/SVG/main" r:embed="rId15"/>
+                  </a:ext>
+                </a:extLst>
+              </a:blip>
+              <a:stretch>
+                <a:fillRect/>
+              </a:stretch>
+            </p:blipFill>
+            <p:spPr>
+              <a:xfrm>
+                <a:off x="3587692" y="6674729"/>
+                <a:ext cx="457200" cy="457200"/>
+              </a:xfrm>
+              <a:prstGeom prst="rect">
+                <a:avLst/>
+              </a:prstGeom>
+            </p:spPr>
+          </p:pic>
+          <p:sp>
+            <p:nvSpPr>
+              <p:cNvPr id="52" name="TextBox 16">
+                <a:extLst>
+                  <a:ext uri="{FF2B5EF4-FFF2-40B4-BE49-F238E27FC236}">
+                    <a16:creationId xmlns:a16="http://schemas.microsoft.com/office/drawing/2014/main" id="{A3F2A15B-18CA-500A-D39B-E58A32768E41}"/>
+                  </a:ext>
+                </a:extLst>
+              </p:cNvPr>
+              <p:cNvSpPr txBox="1">
+                <a:spLocks noChangeArrowheads="1"/>
+              </p:cNvSpPr>
+              <p:nvPr/>
+            </p:nvSpPr>
+            <p:spPr bwMode="auto">
+              <a:xfrm>
+                <a:off x="5087129" y="7130920"/>
+                <a:ext cx="1267968" cy="584775"/>
+              </a:xfrm>
+              <a:prstGeom prst="rect">
+                <a:avLst/>
+              </a:prstGeom>
+              <a:noFill/>
+              <a:ln>
+                <a:noFill/>
+              </a:ln>
+              <a:extLst>
+                <a:ext uri="{909E8E84-426E-40DD-AFC4-6F175D3DCCD1}">
+                  <a14:hiddenFill xmlns:a14="http://schemas.microsoft.com/office/drawing/2010/main">
+                    <a:solidFill>
+                      <a:srgbClr val="FFFFFF"/>
+                    </a:solidFill>
+                  </a14:hiddenFill>
+                </a:ext>
+                <a:ext uri="{91240B29-F687-4F45-9708-019B960494DF}">
+                  <a14:hiddenLine xmlns:a14="http://schemas.microsoft.com/office/drawing/2010/main" w="9525">
+                    <a:solidFill>
+                      <a:srgbClr val="000000"/>
+                    </a:solidFill>
+                    <a:miter lim="800000"/>
+                    <a:headEnd/>
+                    <a:tailEnd/>
+                  </a14:hiddenLine>
+                </a:ext>
+              </a:extLst>
+            </p:spPr>
+            <p:txBody>
+              <a:bodyPr wrap="square" lIns="0" rIns="0">
+                <a:spAutoFit/>
+              </a:bodyPr>
+              <a:lstStyle>
+                <a:lvl1pPr>
+                  <a:defRPr>
+                    <a:solidFill>
+                      <a:schemeClr val="tx1"/>
+                    </a:solidFill>
+                    <a:latin typeface="Calibri" panose="020F0502020204030204" pitchFamily="34" charset="0"/>
+                  </a:defRPr>
+                </a:lvl1pPr>
+                <a:lvl2pPr marL="742950" indent="-285750">
+                  <a:defRPr>
+                    <a:solidFill>
+                      <a:schemeClr val="tx1"/>
+                    </a:solidFill>
+                    <a:latin typeface="Calibri" panose="020F0502020204030204" pitchFamily="34" charset="0"/>
+                  </a:defRPr>
+                </a:lvl2pPr>
+                <a:lvl3pPr marL="1143000" indent="-228600">
+                  <a:defRPr>
+                    <a:solidFill>
+                      <a:schemeClr val="tx1"/>
+                    </a:solidFill>
+                    <a:latin typeface="Calibri" panose="020F0502020204030204" pitchFamily="34" charset="0"/>
+                  </a:defRPr>
+                </a:lvl3pPr>
+                <a:lvl4pPr marL="1600200" indent="-228600">
+                  <a:defRPr>
+                    <a:solidFill>
+                      <a:schemeClr val="tx1"/>
+                    </a:solidFill>
+                    <a:latin typeface="Calibri" panose="020F0502020204030204" pitchFamily="34" charset="0"/>
+                  </a:defRPr>
+                </a:lvl4pPr>
+                <a:lvl5pPr marL="2057400" indent="-228600">
+                  <a:defRPr>
+                    <a:solidFill>
+                      <a:schemeClr val="tx1"/>
+                    </a:solidFill>
+                    <a:latin typeface="Calibri" panose="020F0502020204030204" pitchFamily="34" charset="0"/>
+                  </a:defRPr>
+                </a:lvl5pPr>
+                <a:lvl6pPr marL="2514600" indent="-228600" eaLnBrk="0" fontAlgn="base" hangingPunct="0">
+                  <a:spcBef>
+                    <a:spcPct val="0"/>
+                  </a:spcBef>
+                  <a:spcAft>
+                    <a:spcPct val="0"/>
+                  </a:spcAft>
+                  <a:defRPr>
+                    <a:solidFill>
+                      <a:schemeClr val="tx1"/>
+                    </a:solidFill>
+                    <a:latin typeface="Calibri" panose="020F0502020204030204" pitchFamily="34" charset="0"/>
+                  </a:defRPr>
+                </a:lvl6pPr>
+                <a:lvl7pPr marL="2971800" indent="-228600" eaLnBrk="0" fontAlgn="base" hangingPunct="0">
+                  <a:spcBef>
+                    <a:spcPct val="0"/>
+                  </a:spcBef>
+                  <a:spcAft>
+                    <a:spcPct val="0"/>
+                  </a:spcAft>
+                  <a:defRPr>
+                    <a:solidFill>
+                      <a:schemeClr val="tx1"/>
+                    </a:solidFill>
+                    <a:latin typeface="Calibri" panose="020F0502020204030204" pitchFamily="34" charset="0"/>
+                  </a:defRPr>
+                </a:lvl7pPr>
+                <a:lvl8pPr marL="3429000" indent="-228600" eaLnBrk="0" fontAlgn="base" hangingPunct="0">
+                  <a:spcBef>
+                    <a:spcPct val="0"/>
+                  </a:spcBef>
+                  <a:spcAft>
+                    <a:spcPct val="0"/>
+                  </a:spcAft>
+                  <a:defRPr>
+                    <a:solidFill>
+                      <a:schemeClr val="tx1"/>
+                    </a:solidFill>
+                    <a:latin typeface="Calibri" panose="020F0502020204030204" pitchFamily="34" charset="0"/>
+                  </a:defRPr>
+                </a:lvl8pPr>
+                <a:lvl9pPr marL="3886200" indent="-228600" eaLnBrk="0" fontAlgn="base" hangingPunct="0">
+                  <a:spcBef>
+                    <a:spcPct val="0"/>
+                  </a:spcBef>
+                  <a:spcAft>
+                    <a:spcPct val="0"/>
+                  </a:spcAft>
+                  <a:defRPr>
+                    <a:solidFill>
+                      <a:schemeClr val="tx1"/>
+                    </a:solidFill>
+                    <a:latin typeface="Calibri" panose="020F0502020204030204" pitchFamily="34" charset="0"/>
+                  </a:defRPr>
+                </a:lvl9pPr>
+              </a:lstStyle>
+              <a:p>
+                <a:pPr algn="ctr" eaLnBrk="1" hangingPunct="1"/>
+                <a:r>
+                  <a:rPr lang="en-US" altLang="en-US" sz="1200" dirty="0">
+                    <a:solidFill>
+                      <a:srgbClr val="E1700F"/>
+                    </a:solidFill>
+                    <a:latin typeface="Arial" panose="020B0604020202020204" pitchFamily="34" charset="0"/>
+                    <a:ea typeface="Amazon Ember" panose="020B0603020204020204" pitchFamily="34" charset="0"/>
+                    <a:cs typeface="Arial" panose="020B0604020202020204" pitchFamily="34" charset="0"/>
+                  </a:rPr>
+                  <a:t>t3.large</a:t>
+                </a:r>
+              </a:p>
+              <a:p>
+                <a:pPr algn="ctr" eaLnBrk="1" hangingPunct="1"/>
+                <a:r>
+                  <a:rPr lang="en-US" altLang="en-US" sz="1000" dirty="0">
+                    <a:solidFill>
+                      <a:srgbClr val="E1700F"/>
+                    </a:solidFill>
+                    <a:latin typeface="Arial" panose="020B0604020202020204" pitchFamily="34" charset="0"/>
+                    <a:ea typeface="Amazon Ember" panose="020B0603020204020204" pitchFamily="34" charset="0"/>
+                    <a:cs typeface="Arial" panose="020B0604020202020204" pitchFamily="34" charset="0"/>
+                  </a:rPr>
+                  <a:t>Web Server</a:t>
+                </a:r>
+              </a:p>
+              <a:p>
+                <a:pPr algn="ctr" eaLnBrk="1" hangingPunct="1"/>
+                <a:r>
+                  <a:rPr lang="en-US" altLang="en-US" sz="1000" dirty="0">
+                    <a:solidFill>
+                      <a:srgbClr val="E1700F"/>
+                    </a:solidFill>
+                    <a:latin typeface="Arial" panose="020B0604020202020204" pitchFamily="34" charset="0"/>
+                    <a:ea typeface="Amazon Ember" panose="020B0603020204020204" pitchFamily="34" charset="0"/>
+                    <a:cs typeface="Arial" panose="020B0604020202020204" pitchFamily="34" charset="0"/>
+                  </a:rPr>
+                  <a:t>192.168.56.10</a:t>
+                </a:r>
+              </a:p>
+            </p:txBody>
+          </p:sp>
+          <p:pic>
+            <p:nvPicPr>
+              <p:cNvPr id="53" name="Graphic 52">
+                <a:extLst>
+                  <a:ext uri="{FF2B5EF4-FFF2-40B4-BE49-F238E27FC236}">
+                    <a16:creationId xmlns:a16="http://schemas.microsoft.com/office/drawing/2014/main" id="{32002C7D-CAA4-CF07-3231-851018375A01}"/>
+                  </a:ext>
+                </a:extLst>
+              </p:cNvPr>
+              <p:cNvPicPr>
+                <a:picLocks noChangeAspect="1"/>
+              </p:cNvPicPr>
+              <p:nvPr/>
+            </p:nvPicPr>
+            <p:blipFill>
+              <a:blip r:embed="rId14">
+                <a:extLst>
+                  <a:ext uri="{96DAC541-7B7A-43D3-8B79-37D633B846F1}">
+                    <asvg:svgBlip xmlns:asvg="http://schemas.microsoft.com/office/drawing/2016/SVG/main" r:embed="rId15"/>
+                  </a:ext>
+                </a:extLst>
+              </a:blip>
+              <a:stretch>
+                <a:fillRect/>
+              </a:stretch>
+            </p:blipFill>
+            <p:spPr>
+              <a:xfrm>
+                <a:off x="5492513" y="6683728"/>
+                <a:ext cx="457200" cy="457200"/>
+              </a:xfrm>
+              <a:prstGeom prst="rect">
+                <a:avLst/>
+              </a:prstGeom>
+            </p:spPr>
+          </p:pic>
+          <p:sp>
+            <p:nvSpPr>
+              <p:cNvPr id="54" name="Rectangle 53">
+                <a:extLst>
+                  <a:ext uri="{FF2B5EF4-FFF2-40B4-BE49-F238E27FC236}">
+                    <a16:creationId xmlns:a16="http://schemas.microsoft.com/office/drawing/2014/main" id="{7A5D2C39-951D-D056-077F-C2D80336ECF5}"/>
+                  </a:ext>
+                </a:extLst>
+              </p:cNvPr>
+              <p:cNvSpPr/>
+              <p:nvPr/>
+            </p:nvSpPr>
+            <p:spPr>
+              <a:xfrm>
+                <a:off x="7507342" y="5508267"/>
+                <a:ext cx="2389909" cy="2430533"/>
+              </a:xfrm>
+              <a:prstGeom prst="rect">
+                <a:avLst/>
+              </a:prstGeom>
+              <a:solidFill>
+                <a:srgbClr val="C925D1">
+                  <a:alpha val="10000"/>
+                </a:srgbClr>
+              </a:solidFill>
+              <a:ln w="15875" cmpd="sng">
+                <a:solidFill>
+                  <a:srgbClr val="CA24D1"/>
+                </a:solidFill>
+                <a:prstDash val="solid"/>
+              </a:ln>
+            </p:spPr>
+            <p:style>
+              <a:lnRef idx="2">
+                <a:schemeClr val="accent1">
+                  <a:shade val="50000"/>
+                </a:schemeClr>
+              </a:lnRef>
+              <a:fillRef idx="1">
+                <a:schemeClr val="accent1"/>
+              </a:fillRef>
+              <a:effectRef idx="0">
+                <a:schemeClr val="accent1"/>
+              </a:effectRef>
+              <a:fontRef idx="minor">
+                <a:schemeClr val="lt1"/>
+              </a:fontRef>
+            </p:style>
+            <p:txBody>
+              <a:bodyPr lIns="502920" tIns="91441" bIns="45720"/>
+              <a:lstStyle/>
+              <a:p>
+                <a:pPr>
+                  <a:defRPr/>
+                </a:pPr>
+                <a:r>
+                  <a:rPr lang="en-US" sz="600" dirty="0">
+                    <a:solidFill>
+                      <a:srgbClr val="7AA115"/>
+                    </a:solidFill>
+                    <a:latin typeface="Arial" panose="020B0604020202020204" pitchFamily="34" charset="0"/>
+                    <a:cs typeface="Arial" panose="020B0604020202020204" pitchFamily="34" charset="0"/>
+                  </a:rPr>
+                  <a:t>   </a:t>
+                </a:r>
+              </a:p>
+              <a:p>
+                <a:pPr>
+                  <a:defRPr/>
+                </a:pPr>
+                <a:r>
+                  <a:rPr lang="en-US" sz="1200" dirty="0">
+                    <a:solidFill>
+                      <a:srgbClr val="CA24D1"/>
+                    </a:solidFill>
+                    <a:latin typeface="Arial" panose="020B0604020202020204" pitchFamily="34" charset="0"/>
+                    <a:cs typeface="Arial" panose="020B0604020202020204" pitchFamily="34" charset="0"/>
+                  </a:rPr>
+                  <a:t>  Amazon RDS</a:t>
+                </a:r>
+              </a:p>
+            </p:txBody>
+          </p:sp>
+          <p:pic>
+            <p:nvPicPr>
+              <p:cNvPr id="56" name="Graphic 6">
+                <a:extLst>
+                  <a:ext uri="{FF2B5EF4-FFF2-40B4-BE49-F238E27FC236}">
+                    <a16:creationId xmlns:a16="http://schemas.microsoft.com/office/drawing/2014/main" id="{CF2A3EE6-51D8-CC93-6396-F5F6F581AECE}"/>
+                  </a:ext>
+                </a:extLst>
+              </p:cNvPr>
+              <p:cNvPicPr>
+                <a:picLocks noChangeAspect="1" noChangeArrowheads="1"/>
+              </p:cNvPicPr>
+              <p:nvPr/>
+            </p:nvPicPr>
+            <p:blipFill>
+              <a:blip r:embed="rId16">
+                <a:extLst>
+                  <a:ext uri="{96DAC541-7B7A-43D3-8B79-37D633B846F1}">
+                    <asvg:svgBlip xmlns:asvg="http://schemas.microsoft.com/office/drawing/2016/SVG/main" r:embed="rId17"/>
+                  </a:ext>
+                </a:extLst>
+              </a:blip>
+              <a:srcRect/>
+              <a:stretch/>
+            </p:blipFill>
+            <p:spPr bwMode="auto">
+              <a:xfrm>
+                <a:off x="7507339" y="5503201"/>
+                <a:ext cx="533400" cy="533400"/>
+              </a:xfrm>
+              <a:prstGeom prst="rect">
+                <a:avLst/>
+              </a:prstGeom>
+              <a:noFill/>
+              <a:ln>
+                <a:noFill/>
+              </a:ln>
+              <a:extLst>
+                <a:ext uri="{909E8E84-426E-40DD-AFC4-6F175D3DCCD1}">
+                  <a14:hiddenFill xmlns:a14="http://schemas.microsoft.com/office/drawing/2010/main">
+                    <a:solidFill>
+                      <a:srgbClr val="FFFFFF"/>
+                    </a:solidFill>
+                  </a14:hiddenFill>
+                </a:ext>
+                <a:ext uri="{91240B29-F687-4F45-9708-019B960494DF}">
+                  <a14:hiddenLine xmlns:a14="http://schemas.microsoft.com/office/drawing/2010/main" w="9525">
+                    <a:solidFill>
+                      <a:srgbClr val="000000"/>
+                    </a:solidFill>
+                    <a:miter lim="800000"/>
+                    <a:headEnd/>
+                    <a:tailEnd/>
+                  </a14:hiddenLine>
+                </a:ext>
+              </a:extLst>
+            </p:spPr>
+          </p:pic>
+          <p:sp>
+            <p:nvSpPr>
+              <p:cNvPr id="57" name="TextBox 11">
+                <a:extLst>
+                  <a:ext uri="{FF2B5EF4-FFF2-40B4-BE49-F238E27FC236}">
+                    <a16:creationId xmlns:a16="http://schemas.microsoft.com/office/drawing/2014/main" id="{0F836AFC-7E7E-B2D1-20C8-3CA16FDF3E2D}"/>
+                  </a:ext>
+                </a:extLst>
+              </p:cNvPr>
+              <p:cNvSpPr txBox="1">
+                <a:spLocks noChangeArrowheads="1"/>
+              </p:cNvSpPr>
+              <p:nvPr/>
+            </p:nvSpPr>
+            <p:spPr bwMode="auto">
+              <a:xfrm>
+                <a:off x="7926886" y="7140928"/>
+                <a:ext cx="1511300" cy="430887"/>
               </a:xfrm>
               <a:prstGeom prst="rect">
                 <a:avLst/>
@@ -3901,271 +5426,37 @@
                 <a:r>
                   <a:rPr lang="en-US" altLang="en-US" sz="1200" dirty="0">
                     <a:solidFill>
-                      <a:srgbClr val="7AA115"/>
+                      <a:srgbClr val="CA24D1"/>
                     </a:solidFill>
                     <a:latin typeface="Arial" panose="020B0604020202020204" pitchFamily="34" charset="0"/>
                     <a:ea typeface="Amazon Ember" panose="020B0603020204020204" pitchFamily="34" charset="0"/>
                     <a:cs typeface="Arial" panose="020B0604020202020204" pitchFamily="34" charset="0"/>
                   </a:rPr>
-                  <a:t>Amazon Elastic File System</a:t>
+                  <a:t>db.t3.medium</a:t>
                 </a:r>
               </a:p>
-            </p:txBody>
-          </p:sp>
-        </p:grpSp>
-        <p:sp>
-          <p:nvSpPr>
-            <p:cNvPr id="29" name="Rectangle 28">
-              <a:extLst>
-                <a:ext uri="{FF2B5EF4-FFF2-40B4-BE49-F238E27FC236}">
-                  <a16:creationId xmlns:a16="http://schemas.microsoft.com/office/drawing/2014/main" id="{49587B69-FAD1-D540-F046-1EFA52E28862}"/>
-                </a:ext>
-              </a:extLst>
-            </p:cNvPr>
-            <p:cNvSpPr/>
-            <p:nvPr/>
-          </p:nvSpPr>
-          <p:spPr>
-            <a:xfrm>
-              <a:off x="3515340" y="8209000"/>
-              <a:ext cx="2467174" cy="911858"/>
-            </a:xfrm>
-            <a:prstGeom prst="rect">
-              <a:avLst/>
-            </a:prstGeom>
-            <a:solidFill>
-              <a:srgbClr val="8C4FFF">
-                <a:alpha val="10000"/>
-              </a:srgbClr>
-            </a:solidFill>
-            <a:ln w="12700">
-              <a:solidFill>
-                <a:srgbClr val="8C4FFF"/>
-              </a:solidFill>
-              <a:prstDash val="dash"/>
-            </a:ln>
-          </p:spPr>
-          <p:style>
-            <a:lnRef idx="2">
-              <a:schemeClr val="accent1">
-                <a:shade val="50000"/>
-              </a:schemeClr>
-            </a:lnRef>
-            <a:fillRef idx="1">
-              <a:schemeClr val="accent1"/>
-            </a:fillRef>
-            <a:effectRef idx="0">
-              <a:schemeClr val="accent1"/>
-            </a:effectRef>
-            <a:fontRef idx="minor">
-              <a:schemeClr val="lt1"/>
-            </a:fontRef>
-          </p:style>
-          <p:txBody>
-            <a:bodyPr tIns="91441"/>
-            <a:lstStyle/>
-            <a:p>
-              <a:pPr>
-                <a:defRPr/>
-              </a:pPr>
-              <a:endParaRPr lang="en-US" sz="1200" dirty="0">
-                <a:solidFill>
-                  <a:schemeClr val="accent3"/>
-                </a:solidFill>
-              </a:endParaRPr>
-            </a:p>
-          </p:txBody>
-        </p:sp>
-        <p:grpSp>
-          <p:nvGrpSpPr>
-            <p:cNvPr id="30" name="Group 29">
-              <a:extLst>
-                <a:ext uri="{FF2B5EF4-FFF2-40B4-BE49-F238E27FC236}">
-                  <a16:creationId xmlns:a16="http://schemas.microsoft.com/office/drawing/2014/main" id="{0CDE88F1-019D-DA5E-9F3C-3F7AB9BDAFCD}"/>
-                </a:ext>
-              </a:extLst>
-            </p:cNvPr>
-            <p:cNvGrpSpPr/>
-            <p:nvPr/>
-          </p:nvGrpSpPr>
-          <p:grpSpPr>
-            <a:xfrm>
-              <a:off x="4077501" y="8318467"/>
-              <a:ext cx="1342852" cy="734199"/>
-              <a:chOff x="9946877" y="3503004"/>
-              <a:chExt cx="1342852" cy="734199"/>
-            </a:xfrm>
-          </p:grpSpPr>
-          <p:sp>
-            <p:nvSpPr>
-              <p:cNvPr id="31" name="TextBox 18">
-                <a:extLst>
-                  <a:ext uri="{FF2B5EF4-FFF2-40B4-BE49-F238E27FC236}">
-                    <a16:creationId xmlns:a16="http://schemas.microsoft.com/office/drawing/2014/main" id="{4DCEAED4-6118-2237-1A49-B41AA4192D3E}"/>
-                  </a:ext>
-                </a:extLst>
-              </p:cNvPr>
-              <p:cNvSpPr txBox="1">
-                <a:spLocks noChangeArrowheads="1"/>
-              </p:cNvSpPr>
-              <p:nvPr/>
-            </p:nvSpPr>
-            <p:spPr bwMode="auto">
-              <a:xfrm>
-                <a:off x="9946877" y="3960204"/>
-                <a:ext cx="1342852" cy="276999"/>
-              </a:xfrm>
-              <a:prstGeom prst="rect">
-                <a:avLst/>
-              </a:prstGeom>
-              <a:noFill/>
-              <a:ln>
-                <a:noFill/>
-              </a:ln>
-              <a:extLst>
-                <a:ext uri="{909E8E84-426E-40DD-AFC4-6F175D3DCCD1}">
-                  <a14:hiddenFill xmlns:a14="http://schemas.microsoft.com/office/drawing/2010/main">
-                    <a:solidFill>
-                      <a:srgbClr val="FFFFFF"/>
-                    </a:solidFill>
-                  </a14:hiddenFill>
-                </a:ext>
-                <a:ext uri="{91240B29-F687-4F45-9708-019B960494DF}">
-                  <a14:hiddenLine xmlns:a14="http://schemas.microsoft.com/office/drawing/2010/main" w="9525">
-                    <a:solidFill>
-                      <a:srgbClr val="000000"/>
-                    </a:solidFill>
-                    <a:miter lim="800000"/>
-                    <a:headEnd/>
-                    <a:tailEnd/>
-                  </a14:hiddenLine>
-                </a:ext>
-              </a:extLst>
-            </p:spPr>
-            <p:txBody>
-              <a:bodyPr wrap="square">
-                <a:spAutoFit/>
-              </a:bodyPr>
-              <a:lstStyle>
-                <a:lvl1pPr>
-                  <a:defRPr>
-                    <a:solidFill>
-                      <a:schemeClr val="tx1"/>
-                    </a:solidFill>
-                    <a:latin typeface="Calibri" panose="020F0502020204030204" pitchFamily="34" charset="0"/>
-                  </a:defRPr>
-                </a:lvl1pPr>
-                <a:lvl2pPr marL="742950" indent="-285750">
-                  <a:defRPr>
-                    <a:solidFill>
-                      <a:schemeClr val="tx1"/>
-                    </a:solidFill>
-                    <a:latin typeface="Calibri" panose="020F0502020204030204" pitchFamily="34" charset="0"/>
-                  </a:defRPr>
-                </a:lvl2pPr>
-                <a:lvl3pPr marL="1143000" indent="-228600">
-                  <a:defRPr>
-                    <a:solidFill>
-                      <a:schemeClr val="tx1"/>
-                    </a:solidFill>
-                    <a:latin typeface="Calibri" panose="020F0502020204030204" pitchFamily="34" charset="0"/>
-                  </a:defRPr>
-                </a:lvl3pPr>
-                <a:lvl4pPr marL="1600200" indent="-228600">
-                  <a:defRPr>
-                    <a:solidFill>
-                      <a:schemeClr val="tx1"/>
-                    </a:solidFill>
-                    <a:latin typeface="Calibri" panose="020F0502020204030204" pitchFamily="34" charset="0"/>
-                  </a:defRPr>
-                </a:lvl4pPr>
-                <a:lvl5pPr marL="2057400" indent="-228600">
-                  <a:defRPr>
-                    <a:solidFill>
-                      <a:schemeClr val="tx1"/>
-                    </a:solidFill>
-                    <a:latin typeface="Calibri" panose="020F0502020204030204" pitchFamily="34" charset="0"/>
-                  </a:defRPr>
-                </a:lvl5pPr>
-                <a:lvl6pPr marL="2514600" indent="-228600" eaLnBrk="0" fontAlgn="base" hangingPunct="0">
-                  <a:spcBef>
-                    <a:spcPct val="0"/>
-                  </a:spcBef>
-                  <a:spcAft>
-                    <a:spcPct val="0"/>
-                  </a:spcAft>
-                  <a:defRPr>
-                    <a:solidFill>
-                      <a:schemeClr val="tx1"/>
-                    </a:solidFill>
-                    <a:latin typeface="Calibri" panose="020F0502020204030204" pitchFamily="34" charset="0"/>
-                  </a:defRPr>
-                </a:lvl6pPr>
-                <a:lvl7pPr marL="2971800" indent="-228600" eaLnBrk="0" fontAlgn="base" hangingPunct="0">
-                  <a:spcBef>
-                    <a:spcPct val="0"/>
-                  </a:spcBef>
-                  <a:spcAft>
-                    <a:spcPct val="0"/>
-                  </a:spcAft>
-                  <a:defRPr>
-                    <a:solidFill>
-                      <a:schemeClr val="tx1"/>
-                    </a:solidFill>
-                    <a:latin typeface="Calibri" panose="020F0502020204030204" pitchFamily="34" charset="0"/>
-                  </a:defRPr>
-                </a:lvl7pPr>
-                <a:lvl8pPr marL="3429000" indent="-228600" eaLnBrk="0" fontAlgn="base" hangingPunct="0">
-                  <a:spcBef>
-                    <a:spcPct val="0"/>
-                  </a:spcBef>
-                  <a:spcAft>
-                    <a:spcPct val="0"/>
-                  </a:spcAft>
-                  <a:defRPr>
-                    <a:solidFill>
-                      <a:schemeClr val="tx1"/>
-                    </a:solidFill>
-                    <a:latin typeface="Calibri" panose="020F0502020204030204" pitchFamily="34" charset="0"/>
-                  </a:defRPr>
-                </a:lvl8pPr>
-                <a:lvl9pPr marL="3886200" indent="-228600" eaLnBrk="0" fontAlgn="base" hangingPunct="0">
-                  <a:spcBef>
-                    <a:spcPct val="0"/>
-                  </a:spcBef>
-                  <a:spcAft>
-                    <a:spcPct val="0"/>
-                  </a:spcAft>
-                  <a:defRPr>
-                    <a:solidFill>
-                      <a:schemeClr val="tx1"/>
-                    </a:solidFill>
-                    <a:latin typeface="Calibri" panose="020F0502020204030204" pitchFamily="34" charset="0"/>
-                  </a:defRPr>
-                </a:lvl9pPr>
-              </a:lstStyle>
               <a:p>
                 <a:pPr algn="ctr" eaLnBrk="1" hangingPunct="1"/>
                 <a:r>
-                  <a:rPr lang="en-US" altLang="en-US" sz="1200" dirty="0">
-                    <a:solidFill>
-                      <a:srgbClr val="8C4FFF"/>
+                  <a:rPr lang="en-US" altLang="en-US" sz="1000" dirty="0">
+                    <a:solidFill>
+                      <a:srgbClr val="CA24D1"/>
                     </a:solidFill>
                     <a:latin typeface="Arial" panose="020B0604020202020204" pitchFamily="34" charset="0"/>
                     <a:ea typeface="Amazon Ember" panose="020B0603020204020204" pitchFamily="34" charset="0"/>
                     <a:cs typeface="Arial" panose="020B0604020202020204" pitchFamily="34" charset="0"/>
                   </a:rPr>
-                  <a:t>Mount target</a:t>
+                  <a:t>Database</a:t>
                 </a:r>
               </a:p>
             </p:txBody>
           </p:sp>
           <p:pic>
             <p:nvPicPr>
-              <p:cNvPr id="32" name="Graphic 31">
+              <p:cNvPr id="58" name="Graphic 57">
                 <a:extLst>
                   <a:ext uri="{FF2B5EF4-FFF2-40B4-BE49-F238E27FC236}">
-                    <a16:creationId xmlns:a16="http://schemas.microsoft.com/office/drawing/2014/main" id="{FB77860A-92B6-62D4-1A81-E7FBD0FC0B4A}"/>
+                    <a16:creationId xmlns:a16="http://schemas.microsoft.com/office/drawing/2014/main" id="{F34F5174-8047-550E-F1BA-78E6C76BD7B4}"/>
                   </a:ext>
                 </a:extLst>
               </p:cNvPr>
@@ -4175,10 +5466,10 @@
               <p:nvPr/>
             </p:nvPicPr>
             <p:blipFill>
-              <a:blip r:embed="rId10">
+              <a:blip r:embed="rId18">
                 <a:extLst>
                   <a:ext uri="{96DAC541-7B7A-43D3-8B79-37D633B846F1}">
-                    <asvg:svgBlip xmlns:asvg="http://schemas.microsoft.com/office/drawing/2016/SVG/main" r:embed="rId11"/>
+                    <asvg:svgBlip xmlns:asvg="http://schemas.microsoft.com/office/drawing/2016/SVG/main" r:embed="rId19"/>
                   </a:ext>
                 </a:extLst>
               </a:blip>
@@ -4188,7 +5479,7 @@
             </p:blipFill>
             <p:spPr>
               <a:xfrm>
-                <a:off x="10385002" y="3503004"/>
+                <a:off x="8463125" y="6675828"/>
                 <a:ext cx="457200" cy="457200"/>
               </a:xfrm>
               <a:prstGeom prst="rect">
@@ -4197,1224 +5488,6 @@
             </p:spPr>
           </p:pic>
         </p:grpSp>
-        <p:cxnSp>
-          <p:nvCxnSpPr>
-            <p:cNvPr id="34" name="Straight Arrow Connector 33">
-              <a:extLst>
-                <a:ext uri="{FF2B5EF4-FFF2-40B4-BE49-F238E27FC236}">
-                  <a16:creationId xmlns:a16="http://schemas.microsoft.com/office/drawing/2014/main" id="{096AC69F-062F-8D98-52A8-0B0B6E2A2787}"/>
-                </a:ext>
-              </a:extLst>
-            </p:cNvPr>
-            <p:cNvCxnSpPr>
-              <a:cxnSpLocks/>
-              <a:endCxn id="29" idx="2"/>
-            </p:cNvCxnSpPr>
-            <p:nvPr/>
-          </p:nvCxnSpPr>
-          <p:spPr>
-            <a:xfrm flipV="1">
-              <a:off x="4748927" y="9120858"/>
-              <a:ext cx="0" cy="838654"/>
-            </a:xfrm>
-            <a:prstGeom prst="straightConnector1">
-              <a:avLst/>
-            </a:prstGeom>
-            <a:ln w="15875">
-              <a:solidFill>
-                <a:schemeClr val="tx1"/>
-              </a:solidFill>
-              <a:headEnd type="none" w="med" len="sm"/>
-              <a:tailEnd type="none" w="med" len="sm"/>
-            </a:ln>
-          </p:spPr>
-          <p:style>
-            <a:lnRef idx="1">
-              <a:schemeClr val="accent1"/>
-            </a:lnRef>
-            <a:fillRef idx="0">
-              <a:schemeClr val="accent1"/>
-            </a:fillRef>
-            <a:effectRef idx="0">
-              <a:schemeClr val="accent1"/>
-            </a:effectRef>
-            <a:fontRef idx="minor">
-              <a:schemeClr val="tx1"/>
-            </a:fontRef>
-          </p:style>
-        </p:cxnSp>
-        <p:sp>
-          <p:nvSpPr>
-            <p:cNvPr id="37" name="Freeform 36">
-              <a:extLst>
-                <a:ext uri="{FF2B5EF4-FFF2-40B4-BE49-F238E27FC236}">
-                  <a16:creationId xmlns:a16="http://schemas.microsoft.com/office/drawing/2014/main" id="{9837BD43-6E54-7B17-C665-7CC7D0AF68B5}"/>
-                </a:ext>
-              </a:extLst>
-            </p:cNvPr>
-            <p:cNvSpPr/>
-            <p:nvPr/>
-          </p:nvSpPr>
-          <p:spPr bwMode="auto">
-            <a:xfrm>
-              <a:off x="5982515" y="6892820"/>
-              <a:ext cx="1041312" cy="1757435"/>
-            </a:xfrm>
-            <a:custGeom>
-              <a:avLst/>
-              <a:gdLst>
-                <a:gd name="connsiteX0" fmla="*/ 0 w 622300"/>
-                <a:gd name="connsiteY0" fmla="*/ 0 h 1574800"/>
-                <a:gd name="connsiteX1" fmla="*/ 622300 w 622300"/>
-                <a:gd name="connsiteY1" fmla="*/ 0 h 1574800"/>
-                <a:gd name="connsiteX2" fmla="*/ 622300 w 622300"/>
-                <a:gd name="connsiteY2" fmla="*/ 1574800 h 1574800"/>
-                <a:gd name="connsiteX3" fmla="*/ 482600 w 622300"/>
-                <a:gd name="connsiteY3" fmla="*/ 1574800 h 1574800"/>
-                <a:gd name="connsiteX4" fmla="*/ 0 w 622300"/>
-                <a:gd name="connsiteY4" fmla="*/ 1574800 h 1574800"/>
-              </a:gdLst>
-              <a:ahLst/>
-              <a:cxnLst>
-                <a:cxn ang="0">
-                  <a:pos x="connsiteX0" y="connsiteY0"/>
-                </a:cxn>
-                <a:cxn ang="0">
-                  <a:pos x="connsiteX1" y="connsiteY1"/>
-                </a:cxn>
-                <a:cxn ang="0">
-                  <a:pos x="connsiteX2" y="connsiteY2"/>
-                </a:cxn>
-                <a:cxn ang="0">
-                  <a:pos x="connsiteX3" y="connsiteY3"/>
-                </a:cxn>
-                <a:cxn ang="0">
-                  <a:pos x="connsiteX4" y="connsiteY4"/>
-                </a:cxn>
-              </a:cxnLst>
-              <a:rect l="l" t="t" r="r" b="b"/>
-              <a:pathLst>
-                <a:path w="622300" h="1574800">
-                  <a:moveTo>
-                    <a:pt x="0" y="0"/>
-                  </a:moveTo>
-                  <a:lnTo>
-                    <a:pt x="622300" y="0"/>
-                  </a:lnTo>
-                  <a:lnTo>
-                    <a:pt x="622300" y="1574800"/>
-                  </a:lnTo>
-                  <a:lnTo>
-                    <a:pt x="482600" y="1574800"/>
-                  </a:lnTo>
-                  <a:lnTo>
-                    <a:pt x="0" y="1574800"/>
-                  </a:lnTo>
-                </a:path>
-              </a:pathLst>
-            </a:custGeom>
-            <a:noFill/>
-            <a:ln w="15875">
-              <a:solidFill>
-                <a:schemeClr val="tx1"/>
-              </a:solidFill>
-            </a:ln>
-          </p:spPr>
-          <p:style>
-            <a:lnRef idx="2">
-              <a:schemeClr val="accent1">
-                <a:shade val="50000"/>
-              </a:schemeClr>
-            </a:lnRef>
-            <a:fillRef idx="1">
-              <a:schemeClr val="accent1"/>
-            </a:fillRef>
-            <a:effectRef idx="0">
-              <a:schemeClr val="accent1"/>
-            </a:effectRef>
-            <a:fontRef idx="minor">
-              <a:schemeClr val="lt1"/>
-            </a:fontRef>
-          </p:style>
-          <p:txBody>
-            <a:bodyPr anchor="ctr"/>
-            <a:lstStyle/>
-            <a:p>
-              <a:pPr algn="ctr" eaLnBrk="1" fontAlgn="auto" hangingPunct="1">
-                <a:spcBef>
-                  <a:spcPts val="0"/>
-                </a:spcBef>
-                <a:spcAft>
-                  <a:spcPts val="0"/>
-                </a:spcAft>
-                <a:defRPr/>
-              </a:pPr>
-              <a:endParaRPr lang="en-US" dirty="0"/>
-            </a:p>
-          </p:txBody>
-        </p:sp>
-        <p:sp>
-          <p:nvSpPr>
-            <p:cNvPr id="40" name="Rectangle 39">
-              <a:extLst>
-                <a:ext uri="{FF2B5EF4-FFF2-40B4-BE49-F238E27FC236}">
-                  <a16:creationId xmlns:a16="http://schemas.microsoft.com/office/drawing/2014/main" id="{D056ED1E-EE17-8D6E-FCB9-B06E9D7B8260}"/>
-                </a:ext>
-              </a:extLst>
-            </p:cNvPr>
-            <p:cNvSpPr/>
-            <p:nvPr/>
-          </p:nvSpPr>
-          <p:spPr>
-            <a:xfrm>
-              <a:off x="2550577" y="5508267"/>
-              <a:ext cx="4402760" cy="2430533"/>
-            </a:xfrm>
-            <a:prstGeom prst="rect">
-              <a:avLst/>
-            </a:prstGeom>
-            <a:solidFill>
-              <a:srgbClr val="ED7102">
-                <a:alpha val="10000"/>
-              </a:srgbClr>
-            </a:solidFill>
-            <a:ln w="15875" cmpd="sng">
-              <a:solidFill>
-                <a:srgbClr val="E1700F"/>
-              </a:solidFill>
-              <a:prstDash val="solid"/>
-            </a:ln>
-          </p:spPr>
-          <p:style>
-            <a:lnRef idx="2">
-              <a:schemeClr val="accent1">
-                <a:shade val="50000"/>
-              </a:schemeClr>
-            </a:lnRef>
-            <a:fillRef idx="1">
-              <a:schemeClr val="accent1"/>
-            </a:fillRef>
-            <a:effectRef idx="0">
-              <a:schemeClr val="accent1"/>
-            </a:effectRef>
-            <a:fontRef idx="minor">
-              <a:schemeClr val="lt1"/>
-            </a:fontRef>
-          </p:style>
-          <p:txBody>
-            <a:bodyPr lIns="502920" tIns="91441" bIns="45720"/>
-            <a:lstStyle/>
-            <a:p>
-              <a:pPr>
-                <a:defRPr/>
-              </a:pPr>
-              <a:r>
-                <a:rPr lang="en-US" sz="600" dirty="0">
-                  <a:solidFill>
-                    <a:srgbClr val="7AA115"/>
-                  </a:solidFill>
-                  <a:latin typeface="Arial" panose="020B0604020202020204" pitchFamily="34" charset="0"/>
-                  <a:cs typeface="Arial" panose="020B0604020202020204" pitchFamily="34" charset="0"/>
-                </a:rPr>
-                <a:t>   </a:t>
-              </a:r>
-            </a:p>
-            <a:p>
-              <a:pPr>
-                <a:defRPr/>
-              </a:pPr>
-              <a:r>
-                <a:rPr lang="en-US" sz="1200" dirty="0">
-                  <a:solidFill>
-                    <a:srgbClr val="E1700F"/>
-                  </a:solidFill>
-                  <a:latin typeface="Arial" panose="020B0604020202020204" pitchFamily="34" charset="0"/>
-                  <a:cs typeface="Arial" panose="020B0604020202020204" pitchFamily="34" charset="0"/>
-                </a:rPr>
-                <a:t>  Amazon EC2</a:t>
-              </a:r>
-            </a:p>
-          </p:txBody>
-        </p:sp>
-        <p:sp>
-          <p:nvSpPr>
-            <p:cNvPr id="41" name="Freeform 40">
-              <a:extLst>
-                <a:ext uri="{FF2B5EF4-FFF2-40B4-BE49-F238E27FC236}">
-                  <a16:creationId xmlns:a16="http://schemas.microsoft.com/office/drawing/2014/main" id="{4ABFE5DF-13A8-1A77-0B8F-87A02F39DF19}"/>
-                </a:ext>
-              </a:extLst>
-            </p:cNvPr>
-            <p:cNvSpPr/>
-            <p:nvPr/>
-          </p:nvSpPr>
-          <p:spPr bwMode="auto">
-            <a:xfrm rot="10800000">
-              <a:off x="2474029" y="6912328"/>
-              <a:ext cx="1041311" cy="1757435"/>
-            </a:xfrm>
-            <a:custGeom>
-              <a:avLst/>
-              <a:gdLst>
-                <a:gd name="connsiteX0" fmla="*/ 0 w 622300"/>
-                <a:gd name="connsiteY0" fmla="*/ 0 h 1574800"/>
-                <a:gd name="connsiteX1" fmla="*/ 622300 w 622300"/>
-                <a:gd name="connsiteY1" fmla="*/ 0 h 1574800"/>
-                <a:gd name="connsiteX2" fmla="*/ 622300 w 622300"/>
-                <a:gd name="connsiteY2" fmla="*/ 1574800 h 1574800"/>
-                <a:gd name="connsiteX3" fmla="*/ 482600 w 622300"/>
-                <a:gd name="connsiteY3" fmla="*/ 1574800 h 1574800"/>
-                <a:gd name="connsiteX4" fmla="*/ 0 w 622300"/>
-                <a:gd name="connsiteY4" fmla="*/ 1574800 h 1574800"/>
-              </a:gdLst>
-              <a:ahLst/>
-              <a:cxnLst>
-                <a:cxn ang="0">
-                  <a:pos x="connsiteX0" y="connsiteY0"/>
-                </a:cxn>
-                <a:cxn ang="0">
-                  <a:pos x="connsiteX1" y="connsiteY1"/>
-                </a:cxn>
-                <a:cxn ang="0">
-                  <a:pos x="connsiteX2" y="connsiteY2"/>
-                </a:cxn>
-                <a:cxn ang="0">
-                  <a:pos x="connsiteX3" y="connsiteY3"/>
-                </a:cxn>
-                <a:cxn ang="0">
-                  <a:pos x="connsiteX4" y="connsiteY4"/>
-                </a:cxn>
-              </a:cxnLst>
-              <a:rect l="l" t="t" r="r" b="b"/>
-              <a:pathLst>
-                <a:path w="622300" h="1574800">
-                  <a:moveTo>
-                    <a:pt x="0" y="0"/>
-                  </a:moveTo>
-                  <a:lnTo>
-                    <a:pt x="622300" y="0"/>
-                  </a:lnTo>
-                  <a:lnTo>
-                    <a:pt x="622300" y="1574800"/>
-                  </a:lnTo>
-                  <a:lnTo>
-                    <a:pt x="482600" y="1574800"/>
-                  </a:lnTo>
-                  <a:lnTo>
-                    <a:pt x="0" y="1574800"/>
-                  </a:lnTo>
-                </a:path>
-              </a:pathLst>
-            </a:custGeom>
-            <a:noFill/>
-            <a:ln w="15875">
-              <a:solidFill>
-                <a:schemeClr val="tx1"/>
-              </a:solidFill>
-            </a:ln>
-          </p:spPr>
-          <p:style>
-            <a:lnRef idx="2">
-              <a:schemeClr val="accent1">
-                <a:shade val="50000"/>
-              </a:schemeClr>
-            </a:lnRef>
-            <a:fillRef idx="1">
-              <a:schemeClr val="accent1"/>
-            </a:fillRef>
-            <a:effectRef idx="0">
-              <a:schemeClr val="accent1"/>
-            </a:effectRef>
-            <a:fontRef idx="minor">
-              <a:schemeClr val="lt1"/>
-            </a:fontRef>
-          </p:style>
-          <p:txBody>
-            <a:bodyPr anchor="ctr"/>
-            <a:lstStyle/>
-            <a:p>
-              <a:pPr algn="ctr" eaLnBrk="1" fontAlgn="auto" hangingPunct="1">
-                <a:spcBef>
-                  <a:spcPts val="0"/>
-                </a:spcBef>
-                <a:spcAft>
-                  <a:spcPts val="0"/>
-                </a:spcAft>
-                <a:defRPr/>
-              </a:pPr>
-              <a:endParaRPr lang="en-US" dirty="0"/>
-            </a:p>
-          </p:txBody>
-        </p:sp>
-        <p:pic>
-          <p:nvPicPr>
-            <p:cNvPr id="44" name="Graphic 5">
-              <a:extLst>
-                <a:ext uri="{FF2B5EF4-FFF2-40B4-BE49-F238E27FC236}">
-                  <a16:creationId xmlns:a16="http://schemas.microsoft.com/office/drawing/2014/main" id="{16E1A031-48BA-E77D-5FA2-9972DBDFC107}"/>
-                </a:ext>
-              </a:extLst>
-            </p:cNvPr>
-            <p:cNvPicPr>
-              <a:picLocks noChangeAspect="1" noChangeArrowheads="1"/>
-            </p:cNvPicPr>
-            <p:nvPr/>
-          </p:nvPicPr>
-          <p:blipFill>
-            <a:blip r:embed="rId12">
-              <a:extLst>
-                <a:ext uri="{96DAC541-7B7A-43D3-8B79-37D633B846F1}">
-                  <asvg:svgBlip xmlns:asvg="http://schemas.microsoft.com/office/drawing/2016/SVG/main" r:embed="rId13"/>
-                </a:ext>
-              </a:extLst>
-            </a:blip>
-            <a:srcRect/>
-            <a:stretch/>
-          </p:blipFill>
-          <p:spPr bwMode="auto">
-            <a:xfrm>
-              <a:off x="2550576" y="5503202"/>
-              <a:ext cx="533400" cy="533400"/>
-            </a:xfrm>
-            <a:prstGeom prst="rect">
-              <a:avLst/>
-            </a:prstGeom>
-            <a:noFill/>
-            <a:ln>
-              <a:noFill/>
-            </a:ln>
-            <a:extLst>
-              <a:ext uri="{909E8E84-426E-40DD-AFC4-6F175D3DCCD1}">
-                <a14:hiddenFill xmlns:a14="http://schemas.microsoft.com/office/drawing/2010/main">
-                  <a:solidFill>
-                    <a:srgbClr val="FFFFFF"/>
-                  </a:solidFill>
-                </a14:hiddenFill>
-              </a:ext>
-              <a:ext uri="{91240B29-F687-4F45-9708-019B960494DF}">
-                <a14:hiddenLine xmlns:a14="http://schemas.microsoft.com/office/drawing/2010/main" w="9525">
-                  <a:solidFill>
-                    <a:srgbClr val="000000"/>
-                  </a:solidFill>
-                  <a:miter lim="800000"/>
-                  <a:headEnd/>
-                  <a:tailEnd/>
-                </a14:hiddenLine>
-              </a:ext>
-            </a:extLst>
-          </p:spPr>
-        </p:pic>
-        <p:sp>
-          <p:nvSpPr>
-            <p:cNvPr id="49" name="TextBox 16">
-              <a:extLst>
-                <a:ext uri="{FF2B5EF4-FFF2-40B4-BE49-F238E27FC236}">
-                  <a16:creationId xmlns:a16="http://schemas.microsoft.com/office/drawing/2014/main" id="{384B556A-34DC-59DF-9A2D-4C2CCBC94246}"/>
-                </a:ext>
-              </a:extLst>
-            </p:cNvPr>
-            <p:cNvSpPr txBox="1">
-              <a:spLocks noChangeArrowheads="1"/>
-            </p:cNvSpPr>
-            <p:nvPr/>
-          </p:nvSpPr>
-          <p:spPr bwMode="auto">
-            <a:xfrm>
-              <a:off x="3182308" y="7121921"/>
-              <a:ext cx="1267968" cy="584775"/>
-            </a:xfrm>
-            <a:prstGeom prst="rect">
-              <a:avLst/>
-            </a:prstGeom>
-            <a:noFill/>
-            <a:ln>
-              <a:noFill/>
-            </a:ln>
-            <a:extLst>
-              <a:ext uri="{909E8E84-426E-40DD-AFC4-6F175D3DCCD1}">
-                <a14:hiddenFill xmlns:a14="http://schemas.microsoft.com/office/drawing/2010/main">
-                  <a:solidFill>
-                    <a:srgbClr val="FFFFFF"/>
-                  </a:solidFill>
-                </a14:hiddenFill>
-              </a:ext>
-              <a:ext uri="{91240B29-F687-4F45-9708-019B960494DF}">
-                <a14:hiddenLine xmlns:a14="http://schemas.microsoft.com/office/drawing/2010/main" w="9525">
-                  <a:solidFill>
-                    <a:srgbClr val="000000"/>
-                  </a:solidFill>
-                  <a:miter lim="800000"/>
-                  <a:headEnd/>
-                  <a:tailEnd/>
-                </a14:hiddenLine>
-              </a:ext>
-            </a:extLst>
-          </p:spPr>
-          <p:txBody>
-            <a:bodyPr wrap="square" lIns="0" rIns="0">
-              <a:spAutoFit/>
-            </a:bodyPr>
-            <a:lstStyle>
-              <a:lvl1pPr>
-                <a:defRPr>
-                  <a:solidFill>
-                    <a:schemeClr val="tx1"/>
-                  </a:solidFill>
-                  <a:latin typeface="Calibri" panose="020F0502020204030204" pitchFamily="34" charset="0"/>
-                </a:defRPr>
-              </a:lvl1pPr>
-              <a:lvl2pPr marL="742950" indent="-285750">
-                <a:defRPr>
-                  <a:solidFill>
-                    <a:schemeClr val="tx1"/>
-                  </a:solidFill>
-                  <a:latin typeface="Calibri" panose="020F0502020204030204" pitchFamily="34" charset="0"/>
-                </a:defRPr>
-              </a:lvl2pPr>
-              <a:lvl3pPr marL="1143000" indent="-228600">
-                <a:defRPr>
-                  <a:solidFill>
-                    <a:schemeClr val="tx1"/>
-                  </a:solidFill>
-                  <a:latin typeface="Calibri" panose="020F0502020204030204" pitchFamily="34" charset="0"/>
-                </a:defRPr>
-              </a:lvl3pPr>
-              <a:lvl4pPr marL="1600200" indent="-228600">
-                <a:defRPr>
-                  <a:solidFill>
-                    <a:schemeClr val="tx1"/>
-                  </a:solidFill>
-                  <a:latin typeface="Calibri" panose="020F0502020204030204" pitchFamily="34" charset="0"/>
-                </a:defRPr>
-              </a:lvl4pPr>
-              <a:lvl5pPr marL="2057400" indent="-228600">
-                <a:defRPr>
-                  <a:solidFill>
-                    <a:schemeClr val="tx1"/>
-                  </a:solidFill>
-                  <a:latin typeface="Calibri" panose="020F0502020204030204" pitchFamily="34" charset="0"/>
-                </a:defRPr>
-              </a:lvl5pPr>
-              <a:lvl6pPr marL="2514600" indent="-228600" eaLnBrk="0" fontAlgn="base" hangingPunct="0">
-                <a:spcBef>
-                  <a:spcPct val="0"/>
-                </a:spcBef>
-                <a:spcAft>
-                  <a:spcPct val="0"/>
-                </a:spcAft>
-                <a:defRPr>
-                  <a:solidFill>
-                    <a:schemeClr val="tx1"/>
-                  </a:solidFill>
-                  <a:latin typeface="Calibri" panose="020F0502020204030204" pitchFamily="34" charset="0"/>
-                </a:defRPr>
-              </a:lvl6pPr>
-              <a:lvl7pPr marL="2971800" indent="-228600" eaLnBrk="0" fontAlgn="base" hangingPunct="0">
-                <a:spcBef>
-                  <a:spcPct val="0"/>
-                </a:spcBef>
-                <a:spcAft>
-                  <a:spcPct val="0"/>
-                </a:spcAft>
-                <a:defRPr>
-                  <a:solidFill>
-                    <a:schemeClr val="tx1"/>
-                  </a:solidFill>
-                  <a:latin typeface="Calibri" panose="020F0502020204030204" pitchFamily="34" charset="0"/>
-                </a:defRPr>
-              </a:lvl7pPr>
-              <a:lvl8pPr marL="3429000" indent="-228600" eaLnBrk="0" fontAlgn="base" hangingPunct="0">
-                <a:spcBef>
-                  <a:spcPct val="0"/>
-                </a:spcBef>
-                <a:spcAft>
-                  <a:spcPct val="0"/>
-                </a:spcAft>
-                <a:defRPr>
-                  <a:solidFill>
-                    <a:schemeClr val="tx1"/>
-                  </a:solidFill>
-                  <a:latin typeface="Calibri" panose="020F0502020204030204" pitchFamily="34" charset="0"/>
-                </a:defRPr>
-              </a:lvl8pPr>
-              <a:lvl9pPr marL="3886200" indent="-228600" eaLnBrk="0" fontAlgn="base" hangingPunct="0">
-                <a:spcBef>
-                  <a:spcPct val="0"/>
-                </a:spcBef>
-                <a:spcAft>
-                  <a:spcPct val="0"/>
-                </a:spcAft>
-                <a:defRPr>
-                  <a:solidFill>
-                    <a:schemeClr val="tx1"/>
-                  </a:solidFill>
-                  <a:latin typeface="Calibri" panose="020F0502020204030204" pitchFamily="34" charset="0"/>
-                </a:defRPr>
-              </a:lvl9pPr>
-            </a:lstStyle>
-            <a:p>
-              <a:pPr algn="ctr" eaLnBrk="1" hangingPunct="1"/>
-              <a:r>
-                <a:rPr lang="en-US" altLang="en-US" sz="1200" dirty="0">
-                  <a:solidFill>
-                    <a:srgbClr val="E1700F"/>
-                  </a:solidFill>
-                  <a:latin typeface="Arial" panose="020B0604020202020204" pitchFamily="34" charset="0"/>
-                  <a:ea typeface="Amazon Ember" panose="020B0603020204020204" pitchFamily="34" charset="0"/>
-                  <a:cs typeface="Arial" panose="020B0604020202020204" pitchFamily="34" charset="0"/>
-                </a:rPr>
-                <a:t>t3.medium</a:t>
-              </a:r>
-            </a:p>
-            <a:p>
-              <a:pPr algn="ctr" eaLnBrk="1" hangingPunct="1"/>
-              <a:r>
-                <a:rPr lang="en-US" altLang="en-US" sz="1000" dirty="0">
-                  <a:solidFill>
-                    <a:srgbClr val="E1700F"/>
-                  </a:solidFill>
-                  <a:latin typeface="Arial" panose="020B0604020202020204" pitchFamily="34" charset="0"/>
-                  <a:ea typeface="Amazon Ember" panose="020B0603020204020204" pitchFamily="34" charset="0"/>
-                  <a:cs typeface="Arial" panose="020B0604020202020204" pitchFamily="34" charset="0"/>
-                </a:rPr>
-                <a:t>Container Service</a:t>
-              </a:r>
-            </a:p>
-            <a:p>
-              <a:pPr algn="ctr" eaLnBrk="1" hangingPunct="1"/>
-              <a:r>
-                <a:rPr lang="en-US" altLang="en-US" sz="1000" dirty="0">
-                  <a:solidFill>
-                    <a:srgbClr val="E1700F"/>
-                  </a:solidFill>
-                  <a:latin typeface="Arial" panose="020B0604020202020204" pitchFamily="34" charset="0"/>
-                  <a:ea typeface="Amazon Ember" panose="020B0603020204020204" pitchFamily="34" charset="0"/>
-                  <a:cs typeface="Arial" panose="020B0604020202020204" pitchFamily="34" charset="0"/>
-                </a:rPr>
-                <a:t>192.168.56.14</a:t>
-              </a:r>
-            </a:p>
-          </p:txBody>
-        </p:sp>
-        <p:pic>
-          <p:nvPicPr>
-            <p:cNvPr id="50" name="Graphic 49">
-              <a:extLst>
-                <a:ext uri="{FF2B5EF4-FFF2-40B4-BE49-F238E27FC236}">
-                  <a16:creationId xmlns:a16="http://schemas.microsoft.com/office/drawing/2014/main" id="{5BCAF775-38A0-2292-364B-1BCA6DFB6A35}"/>
-                </a:ext>
-              </a:extLst>
-            </p:cNvPr>
-            <p:cNvPicPr>
-              <a:picLocks noChangeAspect="1"/>
-            </p:cNvPicPr>
-            <p:nvPr/>
-          </p:nvPicPr>
-          <p:blipFill>
-            <a:blip r:embed="rId14">
-              <a:extLst>
-                <a:ext uri="{96DAC541-7B7A-43D3-8B79-37D633B846F1}">
-                  <asvg:svgBlip xmlns:asvg="http://schemas.microsoft.com/office/drawing/2016/SVG/main" r:embed="rId15"/>
-                </a:ext>
-              </a:extLst>
-            </a:blip>
-            <a:stretch>
-              <a:fillRect/>
-            </a:stretch>
-          </p:blipFill>
-          <p:spPr>
-            <a:xfrm>
-              <a:off x="3587692" y="6674729"/>
-              <a:ext cx="457200" cy="457200"/>
-            </a:xfrm>
-            <a:prstGeom prst="rect">
-              <a:avLst/>
-            </a:prstGeom>
-          </p:spPr>
-        </p:pic>
-        <p:sp>
-          <p:nvSpPr>
-            <p:cNvPr id="52" name="TextBox 16">
-              <a:extLst>
-                <a:ext uri="{FF2B5EF4-FFF2-40B4-BE49-F238E27FC236}">
-                  <a16:creationId xmlns:a16="http://schemas.microsoft.com/office/drawing/2014/main" id="{A3F2A15B-18CA-500A-D39B-E58A32768E41}"/>
-                </a:ext>
-              </a:extLst>
-            </p:cNvPr>
-            <p:cNvSpPr txBox="1">
-              <a:spLocks noChangeArrowheads="1"/>
-            </p:cNvSpPr>
-            <p:nvPr/>
-          </p:nvSpPr>
-          <p:spPr bwMode="auto">
-            <a:xfrm>
-              <a:off x="5087129" y="7130920"/>
-              <a:ext cx="1267968" cy="584775"/>
-            </a:xfrm>
-            <a:prstGeom prst="rect">
-              <a:avLst/>
-            </a:prstGeom>
-            <a:noFill/>
-            <a:ln>
-              <a:noFill/>
-            </a:ln>
-            <a:extLst>
-              <a:ext uri="{909E8E84-426E-40DD-AFC4-6F175D3DCCD1}">
-                <a14:hiddenFill xmlns:a14="http://schemas.microsoft.com/office/drawing/2010/main">
-                  <a:solidFill>
-                    <a:srgbClr val="FFFFFF"/>
-                  </a:solidFill>
-                </a14:hiddenFill>
-              </a:ext>
-              <a:ext uri="{91240B29-F687-4F45-9708-019B960494DF}">
-                <a14:hiddenLine xmlns:a14="http://schemas.microsoft.com/office/drawing/2010/main" w="9525">
-                  <a:solidFill>
-                    <a:srgbClr val="000000"/>
-                  </a:solidFill>
-                  <a:miter lim="800000"/>
-                  <a:headEnd/>
-                  <a:tailEnd/>
-                </a14:hiddenLine>
-              </a:ext>
-            </a:extLst>
-          </p:spPr>
-          <p:txBody>
-            <a:bodyPr wrap="square" lIns="0" rIns="0">
-              <a:spAutoFit/>
-            </a:bodyPr>
-            <a:lstStyle>
-              <a:lvl1pPr>
-                <a:defRPr>
-                  <a:solidFill>
-                    <a:schemeClr val="tx1"/>
-                  </a:solidFill>
-                  <a:latin typeface="Calibri" panose="020F0502020204030204" pitchFamily="34" charset="0"/>
-                </a:defRPr>
-              </a:lvl1pPr>
-              <a:lvl2pPr marL="742950" indent="-285750">
-                <a:defRPr>
-                  <a:solidFill>
-                    <a:schemeClr val="tx1"/>
-                  </a:solidFill>
-                  <a:latin typeface="Calibri" panose="020F0502020204030204" pitchFamily="34" charset="0"/>
-                </a:defRPr>
-              </a:lvl2pPr>
-              <a:lvl3pPr marL="1143000" indent="-228600">
-                <a:defRPr>
-                  <a:solidFill>
-                    <a:schemeClr val="tx1"/>
-                  </a:solidFill>
-                  <a:latin typeface="Calibri" panose="020F0502020204030204" pitchFamily="34" charset="0"/>
-                </a:defRPr>
-              </a:lvl3pPr>
-              <a:lvl4pPr marL="1600200" indent="-228600">
-                <a:defRPr>
-                  <a:solidFill>
-                    <a:schemeClr val="tx1"/>
-                  </a:solidFill>
-                  <a:latin typeface="Calibri" panose="020F0502020204030204" pitchFamily="34" charset="0"/>
-                </a:defRPr>
-              </a:lvl4pPr>
-              <a:lvl5pPr marL="2057400" indent="-228600">
-                <a:defRPr>
-                  <a:solidFill>
-                    <a:schemeClr val="tx1"/>
-                  </a:solidFill>
-                  <a:latin typeface="Calibri" panose="020F0502020204030204" pitchFamily="34" charset="0"/>
-                </a:defRPr>
-              </a:lvl5pPr>
-              <a:lvl6pPr marL="2514600" indent="-228600" eaLnBrk="0" fontAlgn="base" hangingPunct="0">
-                <a:spcBef>
-                  <a:spcPct val="0"/>
-                </a:spcBef>
-                <a:spcAft>
-                  <a:spcPct val="0"/>
-                </a:spcAft>
-                <a:defRPr>
-                  <a:solidFill>
-                    <a:schemeClr val="tx1"/>
-                  </a:solidFill>
-                  <a:latin typeface="Calibri" panose="020F0502020204030204" pitchFamily="34" charset="0"/>
-                </a:defRPr>
-              </a:lvl6pPr>
-              <a:lvl7pPr marL="2971800" indent="-228600" eaLnBrk="0" fontAlgn="base" hangingPunct="0">
-                <a:spcBef>
-                  <a:spcPct val="0"/>
-                </a:spcBef>
-                <a:spcAft>
-                  <a:spcPct val="0"/>
-                </a:spcAft>
-                <a:defRPr>
-                  <a:solidFill>
-                    <a:schemeClr val="tx1"/>
-                  </a:solidFill>
-                  <a:latin typeface="Calibri" panose="020F0502020204030204" pitchFamily="34" charset="0"/>
-                </a:defRPr>
-              </a:lvl7pPr>
-              <a:lvl8pPr marL="3429000" indent="-228600" eaLnBrk="0" fontAlgn="base" hangingPunct="0">
-                <a:spcBef>
-                  <a:spcPct val="0"/>
-                </a:spcBef>
-                <a:spcAft>
-                  <a:spcPct val="0"/>
-                </a:spcAft>
-                <a:defRPr>
-                  <a:solidFill>
-                    <a:schemeClr val="tx1"/>
-                  </a:solidFill>
-                  <a:latin typeface="Calibri" panose="020F0502020204030204" pitchFamily="34" charset="0"/>
-                </a:defRPr>
-              </a:lvl8pPr>
-              <a:lvl9pPr marL="3886200" indent="-228600" eaLnBrk="0" fontAlgn="base" hangingPunct="0">
-                <a:spcBef>
-                  <a:spcPct val="0"/>
-                </a:spcBef>
-                <a:spcAft>
-                  <a:spcPct val="0"/>
-                </a:spcAft>
-                <a:defRPr>
-                  <a:solidFill>
-                    <a:schemeClr val="tx1"/>
-                  </a:solidFill>
-                  <a:latin typeface="Calibri" panose="020F0502020204030204" pitchFamily="34" charset="0"/>
-                </a:defRPr>
-              </a:lvl9pPr>
-            </a:lstStyle>
-            <a:p>
-              <a:pPr algn="ctr" eaLnBrk="1" hangingPunct="1"/>
-              <a:r>
-                <a:rPr lang="en-US" altLang="en-US" sz="1200" dirty="0">
-                  <a:solidFill>
-                    <a:srgbClr val="E1700F"/>
-                  </a:solidFill>
-                  <a:latin typeface="Arial" panose="020B0604020202020204" pitchFamily="34" charset="0"/>
-                  <a:ea typeface="Amazon Ember" panose="020B0603020204020204" pitchFamily="34" charset="0"/>
-                  <a:cs typeface="Arial" panose="020B0604020202020204" pitchFamily="34" charset="0"/>
-                </a:rPr>
-                <a:t>t3.large</a:t>
-              </a:r>
-            </a:p>
-            <a:p>
-              <a:pPr algn="ctr" eaLnBrk="1" hangingPunct="1"/>
-              <a:r>
-                <a:rPr lang="en-US" altLang="en-US" sz="1000" dirty="0">
-                  <a:solidFill>
-                    <a:srgbClr val="E1700F"/>
-                  </a:solidFill>
-                  <a:latin typeface="Arial" panose="020B0604020202020204" pitchFamily="34" charset="0"/>
-                  <a:ea typeface="Amazon Ember" panose="020B0603020204020204" pitchFamily="34" charset="0"/>
-                  <a:cs typeface="Arial" panose="020B0604020202020204" pitchFamily="34" charset="0"/>
-                </a:rPr>
-                <a:t>Web Server</a:t>
-              </a:r>
-            </a:p>
-            <a:p>
-              <a:pPr algn="ctr" eaLnBrk="1" hangingPunct="1"/>
-              <a:r>
-                <a:rPr lang="en-US" altLang="en-US" sz="1000" dirty="0">
-                  <a:solidFill>
-                    <a:srgbClr val="E1700F"/>
-                  </a:solidFill>
-                  <a:latin typeface="Arial" panose="020B0604020202020204" pitchFamily="34" charset="0"/>
-                  <a:ea typeface="Amazon Ember" panose="020B0603020204020204" pitchFamily="34" charset="0"/>
-                  <a:cs typeface="Arial" panose="020B0604020202020204" pitchFamily="34" charset="0"/>
-                </a:rPr>
-                <a:t>192.168.56.10</a:t>
-              </a:r>
-            </a:p>
-          </p:txBody>
-        </p:sp>
-        <p:pic>
-          <p:nvPicPr>
-            <p:cNvPr id="53" name="Graphic 52">
-              <a:extLst>
-                <a:ext uri="{FF2B5EF4-FFF2-40B4-BE49-F238E27FC236}">
-                  <a16:creationId xmlns:a16="http://schemas.microsoft.com/office/drawing/2014/main" id="{32002C7D-CAA4-CF07-3231-851018375A01}"/>
-                </a:ext>
-              </a:extLst>
-            </p:cNvPr>
-            <p:cNvPicPr>
-              <a:picLocks noChangeAspect="1"/>
-            </p:cNvPicPr>
-            <p:nvPr/>
-          </p:nvPicPr>
-          <p:blipFill>
-            <a:blip r:embed="rId14">
-              <a:extLst>
-                <a:ext uri="{96DAC541-7B7A-43D3-8B79-37D633B846F1}">
-                  <asvg:svgBlip xmlns:asvg="http://schemas.microsoft.com/office/drawing/2016/SVG/main" r:embed="rId15"/>
-                </a:ext>
-              </a:extLst>
-            </a:blip>
-            <a:stretch>
-              <a:fillRect/>
-            </a:stretch>
-          </p:blipFill>
-          <p:spPr>
-            <a:xfrm>
-              <a:off x="5492513" y="6683728"/>
-              <a:ext cx="457200" cy="457200"/>
-            </a:xfrm>
-            <a:prstGeom prst="rect">
-              <a:avLst/>
-            </a:prstGeom>
-          </p:spPr>
-        </p:pic>
-        <p:sp>
-          <p:nvSpPr>
-            <p:cNvPr id="54" name="Rectangle 53">
-              <a:extLst>
-                <a:ext uri="{FF2B5EF4-FFF2-40B4-BE49-F238E27FC236}">
-                  <a16:creationId xmlns:a16="http://schemas.microsoft.com/office/drawing/2014/main" id="{7A5D2C39-951D-D056-077F-C2D80336ECF5}"/>
-                </a:ext>
-              </a:extLst>
-            </p:cNvPr>
-            <p:cNvSpPr/>
-            <p:nvPr/>
-          </p:nvSpPr>
-          <p:spPr>
-            <a:xfrm>
-              <a:off x="7507342" y="5508267"/>
-              <a:ext cx="2389909" cy="2430533"/>
-            </a:xfrm>
-            <a:prstGeom prst="rect">
-              <a:avLst/>
-            </a:prstGeom>
-            <a:solidFill>
-              <a:srgbClr val="C925D1">
-                <a:alpha val="10000"/>
-              </a:srgbClr>
-            </a:solidFill>
-            <a:ln w="15875" cmpd="sng">
-              <a:solidFill>
-                <a:srgbClr val="CA24D1"/>
-              </a:solidFill>
-              <a:prstDash val="solid"/>
-            </a:ln>
-          </p:spPr>
-          <p:style>
-            <a:lnRef idx="2">
-              <a:schemeClr val="accent1">
-                <a:shade val="50000"/>
-              </a:schemeClr>
-            </a:lnRef>
-            <a:fillRef idx="1">
-              <a:schemeClr val="accent1"/>
-            </a:fillRef>
-            <a:effectRef idx="0">
-              <a:schemeClr val="accent1"/>
-            </a:effectRef>
-            <a:fontRef idx="minor">
-              <a:schemeClr val="lt1"/>
-            </a:fontRef>
-          </p:style>
-          <p:txBody>
-            <a:bodyPr lIns="502920" tIns="91441" bIns="45720"/>
-            <a:lstStyle/>
-            <a:p>
-              <a:pPr>
-                <a:defRPr/>
-              </a:pPr>
-              <a:r>
-                <a:rPr lang="en-US" sz="600" dirty="0">
-                  <a:solidFill>
-                    <a:srgbClr val="7AA115"/>
-                  </a:solidFill>
-                  <a:latin typeface="Arial" panose="020B0604020202020204" pitchFamily="34" charset="0"/>
-                  <a:cs typeface="Arial" panose="020B0604020202020204" pitchFamily="34" charset="0"/>
-                </a:rPr>
-                <a:t>   </a:t>
-              </a:r>
-            </a:p>
-            <a:p>
-              <a:pPr>
-                <a:defRPr/>
-              </a:pPr>
-              <a:r>
-                <a:rPr lang="en-US" sz="1200" dirty="0">
-                  <a:solidFill>
-                    <a:srgbClr val="CA24D1"/>
-                  </a:solidFill>
-                  <a:latin typeface="Arial" panose="020B0604020202020204" pitchFamily="34" charset="0"/>
-                  <a:cs typeface="Arial" panose="020B0604020202020204" pitchFamily="34" charset="0"/>
-                </a:rPr>
-                <a:t>  Amazon RDS</a:t>
-              </a:r>
-            </a:p>
-          </p:txBody>
-        </p:sp>
-        <p:pic>
-          <p:nvPicPr>
-            <p:cNvPr id="56" name="Graphic 6">
-              <a:extLst>
-                <a:ext uri="{FF2B5EF4-FFF2-40B4-BE49-F238E27FC236}">
-                  <a16:creationId xmlns:a16="http://schemas.microsoft.com/office/drawing/2014/main" id="{CF2A3EE6-51D8-CC93-6396-F5F6F581AECE}"/>
-                </a:ext>
-              </a:extLst>
-            </p:cNvPr>
-            <p:cNvPicPr>
-              <a:picLocks noChangeAspect="1" noChangeArrowheads="1"/>
-            </p:cNvPicPr>
-            <p:nvPr/>
-          </p:nvPicPr>
-          <p:blipFill>
-            <a:blip r:embed="rId16">
-              <a:extLst>
-                <a:ext uri="{96DAC541-7B7A-43D3-8B79-37D633B846F1}">
-                  <asvg:svgBlip xmlns:asvg="http://schemas.microsoft.com/office/drawing/2016/SVG/main" r:embed="rId17"/>
-                </a:ext>
-              </a:extLst>
-            </a:blip>
-            <a:srcRect/>
-            <a:stretch/>
-          </p:blipFill>
-          <p:spPr bwMode="auto">
-            <a:xfrm>
-              <a:off x="7507339" y="5503201"/>
-              <a:ext cx="533400" cy="533400"/>
-            </a:xfrm>
-            <a:prstGeom prst="rect">
-              <a:avLst/>
-            </a:prstGeom>
-            <a:noFill/>
-            <a:ln>
-              <a:noFill/>
-            </a:ln>
-            <a:extLst>
-              <a:ext uri="{909E8E84-426E-40DD-AFC4-6F175D3DCCD1}">
-                <a14:hiddenFill xmlns:a14="http://schemas.microsoft.com/office/drawing/2010/main">
-                  <a:solidFill>
-                    <a:srgbClr val="FFFFFF"/>
-                  </a:solidFill>
-                </a14:hiddenFill>
-              </a:ext>
-              <a:ext uri="{91240B29-F687-4F45-9708-019B960494DF}">
-                <a14:hiddenLine xmlns:a14="http://schemas.microsoft.com/office/drawing/2010/main" w="9525">
-                  <a:solidFill>
-                    <a:srgbClr val="000000"/>
-                  </a:solidFill>
-                  <a:miter lim="800000"/>
-                  <a:headEnd/>
-                  <a:tailEnd/>
-                </a14:hiddenLine>
-              </a:ext>
-            </a:extLst>
-          </p:spPr>
-        </p:pic>
-        <p:sp>
-          <p:nvSpPr>
-            <p:cNvPr id="57" name="TextBox 11">
-              <a:extLst>
-                <a:ext uri="{FF2B5EF4-FFF2-40B4-BE49-F238E27FC236}">
-                  <a16:creationId xmlns:a16="http://schemas.microsoft.com/office/drawing/2014/main" id="{0F836AFC-7E7E-B2D1-20C8-3CA16FDF3E2D}"/>
-                </a:ext>
-              </a:extLst>
-            </p:cNvPr>
-            <p:cNvSpPr txBox="1">
-              <a:spLocks noChangeArrowheads="1"/>
-            </p:cNvSpPr>
-            <p:nvPr/>
-          </p:nvSpPr>
-          <p:spPr bwMode="auto">
-            <a:xfrm>
-              <a:off x="7926886" y="7140928"/>
-              <a:ext cx="1511300" cy="430887"/>
-            </a:xfrm>
-            <a:prstGeom prst="rect">
-              <a:avLst/>
-            </a:prstGeom>
-            <a:noFill/>
-            <a:ln>
-              <a:noFill/>
-            </a:ln>
-            <a:extLst>
-              <a:ext uri="{909E8E84-426E-40DD-AFC4-6F175D3DCCD1}">
-                <a14:hiddenFill xmlns:a14="http://schemas.microsoft.com/office/drawing/2010/main">
-                  <a:solidFill>
-                    <a:srgbClr val="FFFFFF"/>
-                  </a:solidFill>
-                </a14:hiddenFill>
-              </a:ext>
-              <a:ext uri="{91240B29-F687-4F45-9708-019B960494DF}">
-                <a14:hiddenLine xmlns:a14="http://schemas.microsoft.com/office/drawing/2010/main" w="9525">
-                  <a:solidFill>
-                    <a:srgbClr val="000000"/>
-                  </a:solidFill>
-                  <a:miter lim="800000"/>
-                  <a:headEnd/>
-                  <a:tailEnd/>
-                </a14:hiddenLine>
-              </a:ext>
-            </a:extLst>
-          </p:spPr>
-          <p:txBody>
-            <a:bodyPr>
-              <a:spAutoFit/>
-            </a:bodyPr>
-            <a:lstStyle>
-              <a:lvl1pPr>
-                <a:defRPr>
-                  <a:solidFill>
-                    <a:schemeClr val="tx1"/>
-                  </a:solidFill>
-                  <a:latin typeface="Calibri" panose="020F0502020204030204" pitchFamily="34" charset="0"/>
-                </a:defRPr>
-              </a:lvl1pPr>
-              <a:lvl2pPr marL="742950" indent="-285750">
-                <a:defRPr>
-                  <a:solidFill>
-                    <a:schemeClr val="tx1"/>
-                  </a:solidFill>
-                  <a:latin typeface="Calibri" panose="020F0502020204030204" pitchFamily="34" charset="0"/>
-                </a:defRPr>
-              </a:lvl2pPr>
-              <a:lvl3pPr marL="1143000" indent="-228600">
-                <a:defRPr>
-                  <a:solidFill>
-                    <a:schemeClr val="tx1"/>
-                  </a:solidFill>
-                  <a:latin typeface="Calibri" panose="020F0502020204030204" pitchFamily="34" charset="0"/>
-                </a:defRPr>
-              </a:lvl3pPr>
-              <a:lvl4pPr marL="1600200" indent="-228600">
-                <a:defRPr>
-                  <a:solidFill>
-                    <a:schemeClr val="tx1"/>
-                  </a:solidFill>
-                  <a:latin typeface="Calibri" panose="020F0502020204030204" pitchFamily="34" charset="0"/>
-                </a:defRPr>
-              </a:lvl4pPr>
-              <a:lvl5pPr marL="2057400" indent="-228600">
-                <a:defRPr>
-                  <a:solidFill>
-                    <a:schemeClr val="tx1"/>
-                  </a:solidFill>
-                  <a:latin typeface="Calibri" panose="020F0502020204030204" pitchFamily="34" charset="0"/>
-                </a:defRPr>
-              </a:lvl5pPr>
-              <a:lvl6pPr marL="2514600" indent="-228600" eaLnBrk="0" fontAlgn="base" hangingPunct="0">
-                <a:spcBef>
-                  <a:spcPct val="0"/>
-                </a:spcBef>
-                <a:spcAft>
-                  <a:spcPct val="0"/>
-                </a:spcAft>
-                <a:defRPr>
-                  <a:solidFill>
-                    <a:schemeClr val="tx1"/>
-                  </a:solidFill>
-                  <a:latin typeface="Calibri" panose="020F0502020204030204" pitchFamily="34" charset="0"/>
-                </a:defRPr>
-              </a:lvl6pPr>
-              <a:lvl7pPr marL="2971800" indent="-228600" eaLnBrk="0" fontAlgn="base" hangingPunct="0">
-                <a:spcBef>
-                  <a:spcPct val="0"/>
-                </a:spcBef>
-                <a:spcAft>
-                  <a:spcPct val="0"/>
-                </a:spcAft>
-                <a:defRPr>
-                  <a:solidFill>
-                    <a:schemeClr val="tx1"/>
-                  </a:solidFill>
-                  <a:latin typeface="Calibri" panose="020F0502020204030204" pitchFamily="34" charset="0"/>
-                </a:defRPr>
-              </a:lvl7pPr>
-              <a:lvl8pPr marL="3429000" indent="-228600" eaLnBrk="0" fontAlgn="base" hangingPunct="0">
-                <a:spcBef>
-                  <a:spcPct val="0"/>
-                </a:spcBef>
-                <a:spcAft>
-                  <a:spcPct val="0"/>
-                </a:spcAft>
-                <a:defRPr>
-                  <a:solidFill>
-                    <a:schemeClr val="tx1"/>
-                  </a:solidFill>
-                  <a:latin typeface="Calibri" panose="020F0502020204030204" pitchFamily="34" charset="0"/>
-                </a:defRPr>
-              </a:lvl8pPr>
-              <a:lvl9pPr marL="3886200" indent="-228600" eaLnBrk="0" fontAlgn="base" hangingPunct="0">
-                <a:spcBef>
-                  <a:spcPct val="0"/>
-                </a:spcBef>
-                <a:spcAft>
-                  <a:spcPct val="0"/>
-                </a:spcAft>
-                <a:defRPr>
-                  <a:solidFill>
-                    <a:schemeClr val="tx1"/>
-                  </a:solidFill>
-                  <a:latin typeface="Calibri" panose="020F0502020204030204" pitchFamily="34" charset="0"/>
-                </a:defRPr>
-              </a:lvl9pPr>
-            </a:lstStyle>
-            <a:p>
-              <a:pPr algn="ctr" eaLnBrk="1" hangingPunct="1"/>
-              <a:r>
-                <a:rPr lang="en-US" altLang="en-US" sz="1200" dirty="0">
-                  <a:solidFill>
-                    <a:srgbClr val="CA24D1"/>
-                  </a:solidFill>
-                  <a:latin typeface="Arial" panose="020B0604020202020204" pitchFamily="34" charset="0"/>
-                  <a:ea typeface="Amazon Ember" panose="020B0603020204020204" pitchFamily="34" charset="0"/>
-                  <a:cs typeface="Arial" panose="020B0604020202020204" pitchFamily="34" charset="0"/>
-                </a:rPr>
-                <a:t>db.t3.medium</a:t>
-              </a:r>
-            </a:p>
-            <a:p>
-              <a:pPr algn="ctr" eaLnBrk="1" hangingPunct="1"/>
-              <a:r>
-                <a:rPr lang="en-US" altLang="en-US" sz="1000" dirty="0">
-                  <a:solidFill>
-                    <a:srgbClr val="CA24D1"/>
-                  </a:solidFill>
-                  <a:latin typeface="Arial" panose="020B0604020202020204" pitchFamily="34" charset="0"/>
-                  <a:ea typeface="Amazon Ember" panose="020B0603020204020204" pitchFamily="34" charset="0"/>
-                  <a:cs typeface="Arial" panose="020B0604020202020204" pitchFamily="34" charset="0"/>
-                </a:rPr>
-                <a:t>Database</a:t>
-              </a:r>
-            </a:p>
-          </p:txBody>
-        </p:sp>
-        <p:pic>
-          <p:nvPicPr>
-            <p:cNvPr id="58" name="Graphic 57">
-              <a:extLst>
-                <a:ext uri="{FF2B5EF4-FFF2-40B4-BE49-F238E27FC236}">
-                  <a16:creationId xmlns:a16="http://schemas.microsoft.com/office/drawing/2014/main" id="{F34F5174-8047-550E-F1BA-78E6C76BD7B4}"/>
-                </a:ext>
-              </a:extLst>
-            </p:cNvPr>
-            <p:cNvPicPr>
-              <a:picLocks noChangeAspect="1"/>
-            </p:cNvPicPr>
-            <p:nvPr/>
-          </p:nvPicPr>
-          <p:blipFill>
-            <a:blip r:embed="rId18">
-              <a:extLst>
-                <a:ext uri="{96DAC541-7B7A-43D3-8B79-37D633B846F1}">
-                  <asvg:svgBlip xmlns:asvg="http://schemas.microsoft.com/office/drawing/2016/SVG/main" r:embed="rId19"/>
-                </a:ext>
-              </a:extLst>
-            </a:blip>
-            <a:stretch>
-              <a:fillRect/>
-            </a:stretch>
-          </p:blipFill>
-          <p:spPr>
-            <a:xfrm>
-              <a:off x="8463125" y="6675828"/>
-              <a:ext cx="457200" cy="457200"/>
-            </a:xfrm>
-            <a:prstGeom prst="rect">
-              <a:avLst/>
-            </a:prstGeom>
-          </p:spPr>
-        </p:pic>
       </p:grpSp>
     </p:spTree>
     <p:extLst>

</xml_diff>